<commit_message>
new model has been added
</commit_message>
<xml_diff>
--- a/Mod2ProjectPresentation.pptx
+++ b/Mod2ProjectPresentation.pptx
@@ -5,17 +5,17 @@
     <p:sldMasterId id="2147483648" r:id="rId1"/>
   </p:sldMasterIdLst>
   <p:notesMasterIdLst>
-    <p:notesMasterId r:id="rId21"/>
+    <p:notesMasterId r:id="rId22"/>
   </p:notesMasterIdLst>
   <p:sldIdLst>
     <p:sldId id="256" r:id="rId2"/>
     <p:sldId id="258" r:id="rId3"/>
-    <p:sldId id="283" r:id="rId4"/>
-    <p:sldId id="291" r:id="rId5"/>
-    <p:sldId id="284" r:id="rId6"/>
-    <p:sldId id="289" r:id="rId7"/>
-    <p:sldId id="290" r:id="rId8"/>
-    <p:sldId id="292" r:id="rId9"/>
+    <p:sldId id="294" r:id="rId4"/>
+    <p:sldId id="283" r:id="rId5"/>
+    <p:sldId id="291" r:id="rId6"/>
+    <p:sldId id="284" r:id="rId7"/>
+    <p:sldId id="296" r:id="rId8"/>
+    <p:sldId id="295" r:id="rId9"/>
     <p:sldId id="281" r:id="rId10"/>
     <p:sldId id="263" r:id="rId11"/>
     <p:sldId id="266" r:id="rId12"/>
@@ -23,10 +23,11 @@
     <p:sldId id="293" r:id="rId14"/>
     <p:sldId id="265" r:id="rId15"/>
     <p:sldId id="264" r:id="rId16"/>
-    <p:sldId id="285" r:id="rId17"/>
-    <p:sldId id="288" r:id="rId18"/>
-    <p:sldId id="286" r:id="rId19"/>
-    <p:sldId id="287" r:id="rId20"/>
+    <p:sldId id="299" r:id="rId17"/>
+    <p:sldId id="300" r:id="rId18"/>
+    <p:sldId id="301" r:id="rId19"/>
+    <p:sldId id="298" r:id="rId20"/>
+    <p:sldId id="297" r:id="rId21"/>
   </p:sldIdLst>
   <p:sldSz cx="12192000" cy="6858000"/>
   <p:notesSz cx="6858000" cy="9144000"/>
@@ -133,6 +134,342 @@
 </p:presentation>
 </file>
 
+<file path=ppt/ink/ink1.xml><?xml version="1.0" encoding="utf-8"?>
+<inkml:ink xmlns:inkml="http://www.w3.org/2003/InkML">
+  <inkml:definitions>
+    <inkml:context xml:id="ctx0">
+      <inkml:inkSource xml:id="inkSrc0">
+        <inkml:traceFormat>
+          <inkml:channel name="X" type="integer" min="-2.14748E9" max="2.14748E9" units="cm"/>
+          <inkml:channel name="Y" type="integer" min="-2.14748E9" max="2.14748E9" units="cm"/>
+        </inkml:traceFormat>
+        <inkml:channelProperties>
+          <inkml:channelProperty channel="X" name="resolution" value="1000" units="1/cm"/>
+          <inkml:channelProperty channel="Y" name="resolution" value="1000" units="1/cm"/>
+        </inkml:channelProperties>
+      </inkml:inkSource>
+      <inkml:timestamp xml:id="ts0" timeString="2020-09-21T16:23:00.432"/>
+    </inkml:context>
+    <inkml:brush xml:id="br0">
+      <inkml:brushProperty name="width" value="0.3" units="cm"/>
+      <inkml:brushProperty name="height" value="0.6" units="cm"/>
+      <inkml:brushProperty name="color" value="#00FDFF"/>
+      <inkml:brushProperty name="tip" value="rectangle"/>
+      <inkml:brushProperty name="rasterOp" value="maskPen"/>
+    </inkml:brush>
+  </inkml:definitions>
+  <inkml:trace contextRef="#ctx0" brushRef="#br0">1 55,'44'0,"-4"0,-15 0,-4 0,4 0,-6 0,1 0,-1 0,-5 0,4 0,-1 0,3 0,-2 0,0 0,-4 0,5 0,-5 0,4 0,-1 0,-2 0,10 0,-15 0,10 0,-6 0,2 0,3 0,-6 0,4 0,1 0,-3 0,6 0,-8 0,6 0,-3 0,3 0,-6 0,8 0,-6 0,3 0,0 0,-4 0,5-8,0 6,0-7,0 9,-5 0,4 0,-4 0,5 0,0 0,0 0,0-4,0 3,-5-3,4 4,0-5,-3 4,4-3,-6 0,3 4,3-4,-7 4,6-4,-7 0</inkml:trace>
+</inkml:ink>
+</file>
+
+<file path=ppt/ink/ink10.xml><?xml version="1.0" encoding="utf-8"?>
+<inkml:ink xmlns:inkml="http://www.w3.org/2003/InkML">
+  <inkml:definitions>
+    <inkml:context xml:id="ctx0">
+      <inkml:inkSource xml:id="inkSrc0">
+        <inkml:traceFormat>
+          <inkml:channel name="X" type="integer" min="-2.14748E9" max="2.14748E9" units="cm"/>
+          <inkml:channel name="Y" type="integer" min="-2.14748E9" max="2.14748E9" units="cm"/>
+        </inkml:traceFormat>
+        <inkml:channelProperties>
+          <inkml:channelProperty channel="X" name="resolution" value="1000" units="1/cm"/>
+          <inkml:channelProperty channel="Y" name="resolution" value="1000" units="1/cm"/>
+        </inkml:channelProperties>
+      </inkml:inkSource>
+      <inkml:timestamp xml:id="ts0" timeString="2020-09-21T16:28:38.340"/>
+    </inkml:context>
+    <inkml:brush xml:id="br0">
+      <inkml:brushProperty name="width" value="0.3" units="cm"/>
+      <inkml:brushProperty name="height" value="0.6" units="cm"/>
+      <inkml:brushProperty name="color" value="#FFFC00"/>
+      <inkml:brushProperty name="tip" value="rectangle"/>
+      <inkml:brushProperty name="rasterOp" value="maskPen"/>
+    </inkml:brush>
+  </inkml:definitions>
+  <inkml:trace contextRef="#ctx0" brushRef="#br0">1 37,'50'0,"-10"0,-8 0,-11 0,10 0,-4 0,6 0,1 0,-1 0,0 0,0 0,0 0,-6 0,5 0,-5 0,6 0,-6 0,-2 0,1 0,-6 0,6 0,-7 0,6 0,-4 0,4 0,-6 0,0 0,0 0,0 0,0-9,0 7,0-6,0 8,-5 0,4 0,-4 0,9 0,-8-4,6 3,-7-2,5 3,0 0,1-5,-1 4,0-3,0 4,-5 0,4 0,-6 0,6 0,-2 0,-1 0</inkml:trace>
+</inkml:ink>
+</file>
+
+<file path=ppt/ink/ink11.xml><?xml version="1.0" encoding="utf-8"?>
+<inkml:ink xmlns:inkml="http://www.w3.org/2003/InkML">
+  <inkml:definitions>
+    <inkml:context xml:id="ctx0">
+      <inkml:inkSource xml:id="inkSrc0">
+        <inkml:traceFormat>
+          <inkml:channel name="X" type="integer" min="-2.14748E9" max="2.14748E9" units="cm"/>
+          <inkml:channel name="Y" type="integer" min="-2.14748E9" max="2.14748E9" units="cm"/>
+        </inkml:traceFormat>
+        <inkml:channelProperties>
+          <inkml:channelProperty channel="X" name="resolution" value="1000" units="1/cm"/>
+          <inkml:channelProperty channel="Y" name="resolution" value="1000" units="1/cm"/>
+        </inkml:channelProperties>
+      </inkml:inkSource>
+      <inkml:timestamp xml:id="ts0" timeString="2020-09-21T16:28:40.264"/>
+    </inkml:context>
+    <inkml:brush xml:id="br0">
+      <inkml:brushProperty name="width" value="0.3" units="cm"/>
+      <inkml:brushProperty name="height" value="0.6" units="cm"/>
+      <inkml:brushProperty name="color" value="#FFFC00"/>
+      <inkml:brushProperty name="tip" value="rectangle"/>
+      <inkml:brushProperty name="rasterOp" value="maskPen"/>
+    </inkml:brush>
+  </inkml:definitions>
+  <inkml:trace contextRef="#ctx0" brushRef="#br0">1 16,'48'0,"2"0,-16 0,-5 0,18 0,-18 0,29 0,-21 0,14 0,-18 0,0 0,0 0,1 0,-1 0,-6 0,5 0,-12 0,6 0,-7 0,0 0,-5 0,7 0,-11 0,10 0,-4 0,-3 0,8 0,-8 0,5 0,-2 0,-1 0,1 0,0-3,0 2,0-3,0 4,0 0,-1 0,1-3,0 2,0-3,0 4,-1 0,-1 0</inkml:trace>
+</inkml:ink>
+</file>
+
+<file path=ppt/ink/ink12.xml><?xml version="1.0" encoding="utf-8"?>
+<inkml:ink xmlns:inkml="http://www.w3.org/2003/InkML">
+  <inkml:definitions>
+    <inkml:context xml:id="ctx0">
+      <inkml:inkSource xml:id="inkSrc0">
+        <inkml:traceFormat>
+          <inkml:channel name="X" type="integer" min="-2.14748E9" max="2.14748E9" units="cm"/>
+          <inkml:channel name="Y" type="integer" min="-2.14748E9" max="2.14748E9" units="cm"/>
+        </inkml:traceFormat>
+        <inkml:channelProperties>
+          <inkml:channelProperty channel="X" name="resolution" value="1000" units="1/cm"/>
+          <inkml:channelProperty channel="Y" name="resolution" value="1000" units="1/cm"/>
+        </inkml:channelProperties>
+      </inkml:inkSource>
+      <inkml:timestamp xml:id="ts0" timeString="2020-09-21T16:18:03.489"/>
+    </inkml:context>
+    <inkml:brush xml:id="br0">
+      <inkml:brushProperty name="width" value="0.3" units="cm"/>
+      <inkml:brushProperty name="height" value="0.6" units="cm"/>
+      <inkml:brushProperty name="color" value="#FFFC00"/>
+      <inkml:brushProperty name="tip" value="rectangle"/>
+      <inkml:brushProperty name="rasterOp" value="maskPen"/>
+    </inkml:brush>
+  </inkml:definitions>
+  <inkml:trace contextRef="#ctx0" brushRef="#br0">0 103,'46'0,"0"0,-25 0,4 0,1 0,1 0,6 0,0 0,0 0,0 0,1 0,-7 0,4 0,-10 0,10 0,-10 0,4 0,-6 0,-5 0,4 0,-4 0,9 0,-8 0,6 0,-8 0,4 0,4 0,-7 0,6 0,-3 0,-3 0,7 0,-3 0,2 0,2 0,-3 0,-4 0,2 0,-3 0,9 0,-3 0,-2 0,-1 0,-2 0,4 0,0 0,0 0,0 0,0 0,-5 0,4 0,-4 0,5 0,0 0,0 0,0 0,-5 0,4 0,-4 0,5 0,-5 0,4 0,-4 0,8 0,-7 0,2 0,-1 0,-2 0,8 0,-9 0,5-5,-1 4,-2-3,7 0,-8 3,5-4,-5 5,4 0,-1-3,-2 2,10-7,-15 7,7-3,-1 0,-6 3,15-2,-15-1,12 3,-10-2,7-2,-3 4,-2-3,5 0,-6 4,6-4,-3 0,-3 3,5-2,-5 3,2-10,-5-3</inkml:trace>
+</inkml:ink>
+</file>
+
+<file path=ppt/ink/ink2.xml><?xml version="1.0" encoding="utf-8"?>
+<inkml:ink xmlns:inkml="http://www.w3.org/2003/InkML">
+  <inkml:definitions>
+    <inkml:context xml:id="ctx0">
+      <inkml:inkSource xml:id="inkSrc0">
+        <inkml:traceFormat>
+          <inkml:channel name="X" type="integer" min="-2.14748E9" max="2.14748E9" units="cm"/>
+          <inkml:channel name="Y" type="integer" min="-2.14748E9" max="2.14748E9" units="cm"/>
+        </inkml:traceFormat>
+        <inkml:channelProperties>
+          <inkml:channelProperty channel="X" name="resolution" value="1000" units="1/cm"/>
+          <inkml:channelProperty channel="Y" name="resolution" value="1000" units="1/cm"/>
+        </inkml:channelProperties>
+      </inkml:inkSource>
+      <inkml:timestamp xml:id="ts0" timeString="2020-09-21T16:23:02.561"/>
+    </inkml:context>
+    <inkml:brush xml:id="br0">
+      <inkml:brushProperty name="width" value="0.3" units="cm"/>
+      <inkml:brushProperty name="height" value="0.6" units="cm"/>
+      <inkml:brushProperty name="color" value="#00FDFF"/>
+      <inkml:brushProperty name="tip" value="rectangle"/>
+      <inkml:brushProperty name="rasterOp" value="maskPen"/>
+    </inkml:brush>
+  </inkml:definitions>
+  <inkml:trace contextRef="#ctx0" brushRef="#br0">1 16,'60'0,"-4"0,-23 0,-6 0,12 0,-10 0,1 0,0 0,-8 0,5 0,-2 0,-6 0,0 0,0 0,0 0,-5 0,4 0,-5 0,9 0,-8 0,2 0,-1 0,-2 0,12 0,-7 0,0 0,0 0,-4 0,5 0,0 0,-5 0,4 0,0 0,-3 0,6 0,-7 0,0 0,4 0,0 0,-3 0,6 0,-3 0,2 0,-3 0,1 0,-5-4,6 3,-3-2,-2 3,4 0,-6-4,7 0</inkml:trace>
+</inkml:ink>
+</file>
+
+<file path=ppt/ink/ink3.xml><?xml version="1.0" encoding="utf-8"?>
+<inkml:ink xmlns:inkml="http://www.w3.org/2003/InkML">
+  <inkml:definitions>
+    <inkml:context xml:id="ctx0">
+      <inkml:inkSource xml:id="inkSrc0">
+        <inkml:traceFormat>
+          <inkml:channel name="X" type="integer" min="-2.14748E9" max="2.14748E9" units="cm"/>
+          <inkml:channel name="Y" type="integer" min="-2.14748E9" max="2.14748E9" units="cm"/>
+        </inkml:traceFormat>
+        <inkml:channelProperties>
+          <inkml:channelProperty channel="X" name="resolution" value="1000" units="1/cm"/>
+          <inkml:channelProperty channel="Y" name="resolution" value="1000" units="1/cm"/>
+        </inkml:channelProperties>
+      </inkml:inkSource>
+      <inkml:timestamp xml:id="ts0" timeString="2020-09-21T16:23:08.432"/>
+    </inkml:context>
+    <inkml:brush xml:id="br0">
+      <inkml:brushProperty name="width" value="0.3" units="cm"/>
+      <inkml:brushProperty name="height" value="0.6" units="cm"/>
+      <inkml:brushProperty name="color" value="#00FDFF"/>
+      <inkml:brushProperty name="tip" value="rectangle"/>
+      <inkml:brushProperty name="rasterOp" value="maskPen"/>
+    </inkml:brush>
+  </inkml:definitions>
+  <inkml:trace contextRef="#ctx0" brushRef="#br0">1 0,'68'0,"-3"0,-14 0,9 0,1 0,1 0,-3 0,1 0,-7 0,15 0,-23 0,12 0,-15 0,1 0,-2 0,-7 0,-7 0,4 0,-10 0,4 0,-6 0,0 0,0 0,-5 0,4 0,-4 0,5 0,0 0,0 0,0 0,0 0,0 0,0 0,-5 0,3 0,-1 0,4 0</inkml:trace>
+</inkml:ink>
+</file>
+
+<file path=ppt/ink/ink4.xml><?xml version="1.0" encoding="utf-8"?>
+<inkml:ink xmlns:inkml="http://www.w3.org/2003/InkML">
+  <inkml:definitions>
+    <inkml:context xml:id="ctx0">
+      <inkml:inkSource xml:id="inkSrc0">
+        <inkml:traceFormat>
+          <inkml:channel name="X" type="integer" min="-2.14748E9" max="2.14748E9" units="cm"/>
+          <inkml:channel name="Y" type="integer" min="-2.14748E9" max="2.14748E9" units="cm"/>
+        </inkml:traceFormat>
+        <inkml:channelProperties>
+          <inkml:channelProperty channel="X" name="resolution" value="1000" units="1/cm"/>
+          <inkml:channelProperty channel="Y" name="resolution" value="1000" units="1/cm"/>
+        </inkml:channelProperties>
+      </inkml:inkSource>
+      <inkml:timestamp xml:id="ts0" timeString="2020-09-21T16:23:13.216"/>
+    </inkml:context>
+    <inkml:brush xml:id="br0">
+      <inkml:brushProperty name="width" value="0.3" units="cm"/>
+      <inkml:brushProperty name="height" value="0.6" units="cm"/>
+      <inkml:brushProperty name="color" value="#00FDFF"/>
+      <inkml:brushProperty name="tip" value="rectangle"/>
+      <inkml:brushProperty name="rasterOp" value="maskPen"/>
+    </inkml:brush>
+  </inkml:definitions>
+  <inkml:trace contextRef="#ctx0" brushRef="#br0">0 128,'48'-4,"-11"1,-20 3,-3 0,15 0,-7 0,7 0,-10 0,0 0,6 0,-4 0,4-4,-6 2,0-2,0 4,0-4,-4 3,2-3,-3 4,9 0,-8 0,1 0,1 0,-2 0,3 0,-1 0,1-5,2 4,-2-3,-1 4,-4-4,6 4,-3-8,-2 7,1-6,-3 3,4-4,5 3,-7 2,7-2,-3 4,2-7,2 7,-8-4,4 5,-4-4,9 3,-8-7,1 7,1-2,-4 3,8 0,-5 0,-4-3,5 2,-2-2,0 3,6 0,-12 0,10 0,-4 0,-2-4,0 1</inkml:trace>
+</inkml:ink>
+</file>
+
+<file path=ppt/ink/ink5.xml><?xml version="1.0" encoding="utf-8"?>
+<inkml:ink xmlns:inkml="http://www.w3.org/2003/InkML">
+  <inkml:definitions>
+    <inkml:context xml:id="ctx0">
+      <inkml:inkSource xml:id="inkSrc0">
+        <inkml:traceFormat>
+          <inkml:channel name="X" type="integer" min="-2.14748E9" max="2.14748E9" units="cm"/>
+          <inkml:channel name="Y" type="integer" min="-2.14748E9" max="2.14748E9" units="cm"/>
+        </inkml:traceFormat>
+        <inkml:channelProperties>
+          <inkml:channelProperty channel="X" name="resolution" value="1000" units="1/cm"/>
+          <inkml:channelProperty channel="Y" name="resolution" value="1000" units="1/cm"/>
+        </inkml:channelProperties>
+      </inkml:inkSource>
+      <inkml:timestamp xml:id="ts0" timeString="2020-09-21T16:24:52.570"/>
+    </inkml:context>
+    <inkml:brush xml:id="br0">
+      <inkml:brushProperty name="width" value="0.3" units="cm"/>
+      <inkml:brushProperty name="height" value="0.6" units="cm"/>
+      <inkml:brushProperty name="color" value="#A9D8FF"/>
+      <inkml:brushProperty name="tip" value="rectangle"/>
+      <inkml:brushProperty name="rasterOp" value="maskPen"/>
+    </inkml:brush>
+  </inkml:definitions>
+  <inkml:trace contextRef="#ctx0" brushRef="#br0">0 1,'62'0,"6"0,-12 0,-8 0,20 0,-25 0,8 0,-1 0,-7 0,6 0,-14 0,6 0,-14 0,-1 0,-7 0,-1 0,2 0,-6 0,3 0,-4 0,4 0,1 0,-2 0,1 0,-1 0,0 0,0 0,1 0,1 0,1 0,0 0,-5 0,4 0,-4 0,5 0,-5 0,4 0,-4 0,9 0,-8 0,6 0,-8 0,4 0,-1 0,0 0</inkml:trace>
+</inkml:ink>
+</file>
+
+<file path=ppt/ink/ink6.xml><?xml version="1.0" encoding="utf-8"?>
+<inkml:ink xmlns:inkml="http://www.w3.org/2003/InkML">
+  <inkml:definitions>
+    <inkml:context xml:id="ctx0">
+      <inkml:inkSource xml:id="inkSrc0">
+        <inkml:traceFormat>
+          <inkml:channel name="X" type="integer" min="-2.14748E9" max="2.14748E9" units="cm"/>
+          <inkml:channel name="Y" type="integer" min="-2.14748E9" max="2.14748E9" units="cm"/>
+        </inkml:traceFormat>
+        <inkml:channelProperties>
+          <inkml:channelProperty channel="X" name="resolution" value="1000" units="1/cm"/>
+          <inkml:channelProperty channel="Y" name="resolution" value="1000" units="1/cm"/>
+        </inkml:channelProperties>
+      </inkml:inkSource>
+      <inkml:timestamp xml:id="ts0" timeString="2020-09-21T16:24:55.275"/>
+    </inkml:context>
+    <inkml:brush xml:id="br0">
+      <inkml:brushProperty name="width" value="0.3" units="cm"/>
+      <inkml:brushProperty name="height" value="0.6" units="cm"/>
+      <inkml:brushProperty name="color" value="#A9D8FF"/>
+      <inkml:brushProperty name="tip" value="rectangle"/>
+      <inkml:brushProperty name="rasterOp" value="maskPen"/>
+    </inkml:brush>
+  </inkml:definitions>
+  <inkml:trace contextRef="#ctx0" brushRef="#br0">1 0,'64'0,"-2"0,-11 0,0 0,-1 0,10 0,-7 0,6 0,-16 0,15 0,-13 0,7 0,-3 0,-14 0,6 0,-8 0,0 0,-6 0,-1 0,-1 0,-4 0,10 0,-10 0,4 0,-6 0,0 0,0 0,-4 0,1 0,0 0,4 0</inkml:trace>
+</inkml:ink>
+</file>
+
+<file path=ppt/ink/ink7.xml><?xml version="1.0" encoding="utf-8"?>
+<inkml:ink xmlns:inkml="http://www.w3.org/2003/InkML">
+  <inkml:definitions>
+    <inkml:context xml:id="ctx0">
+      <inkml:inkSource xml:id="inkSrc0">
+        <inkml:traceFormat>
+          <inkml:channel name="X" type="integer" min="-2.14748E9" max="2.14748E9" units="cm"/>
+          <inkml:channel name="Y" type="integer" min="-2.14748E9" max="2.14748E9" units="cm"/>
+        </inkml:traceFormat>
+        <inkml:channelProperties>
+          <inkml:channelProperty channel="X" name="resolution" value="1000" units="1/cm"/>
+          <inkml:channelProperty channel="Y" name="resolution" value="1000" units="1/cm"/>
+        </inkml:channelProperties>
+      </inkml:inkSource>
+      <inkml:timestamp xml:id="ts0" timeString="2020-09-21T16:24:56.931"/>
+    </inkml:context>
+    <inkml:brush xml:id="br0">
+      <inkml:brushProperty name="width" value="0.3" units="cm"/>
+      <inkml:brushProperty name="height" value="0.6" units="cm"/>
+      <inkml:brushProperty name="color" value="#A9D8FF"/>
+      <inkml:brushProperty name="tip" value="rectangle"/>
+      <inkml:brushProperty name="rasterOp" value="maskPen"/>
+    </inkml:brush>
+  </inkml:definitions>
+  <inkml:trace contextRef="#ctx0" brushRef="#br0">0 97,'73'0,"4"0,-15 0,10 0,9 0,-7-6,8 4,-11-10,0 10,0-10,-9 4,-11 1,-2-5,-14 11,6-10,-14 10,-2-4,-6 1,0 3,0-4,0 5,-5-3,4 2,-5-3,4 4,-1 0,0 0,-1 0,1 0,1 0,1 0</inkml:trace>
+</inkml:ink>
+</file>
+
+<file path=ppt/ink/ink8.xml><?xml version="1.0" encoding="utf-8"?>
+<inkml:ink xmlns:inkml="http://www.w3.org/2003/InkML">
+  <inkml:definitions>
+    <inkml:context xml:id="ctx0">
+      <inkml:inkSource xml:id="inkSrc0">
+        <inkml:traceFormat>
+          <inkml:channel name="X" type="integer" min="-2.14748E9" max="2.14748E9" units="cm"/>
+          <inkml:channel name="Y" type="integer" min="-2.14748E9" max="2.14748E9" units="cm"/>
+        </inkml:traceFormat>
+        <inkml:channelProperties>
+          <inkml:channelProperty channel="X" name="resolution" value="1000" units="1/cm"/>
+          <inkml:channelProperty channel="Y" name="resolution" value="1000" units="1/cm"/>
+        </inkml:channelProperties>
+      </inkml:inkSource>
+      <inkml:timestamp xml:id="ts0" timeString="2020-09-21T16:28:03.093"/>
+    </inkml:context>
+    <inkml:brush xml:id="br0">
+      <inkml:brushProperty name="width" value="0.3" units="cm"/>
+      <inkml:brushProperty name="height" value="0.6" units="cm"/>
+      <inkml:brushProperty name="color" value="#FF8517"/>
+      <inkml:brushProperty name="tip" value="rectangle"/>
+      <inkml:brushProperty name="rasterOp" value="maskPen"/>
+    </inkml:brush>
+  </inkml:definitions>
+  <inkml:trace contextRef="#ctx0" brushRef="#br0">1 20,'50'0,"-4"0,-12 0,-1 0,8 0,-6 0,6 0,-8 0,8 0,-5 0,5 0,-8 0,0 0,0 0,1 0,-1 0,-6 0,5 0,-6 0,1-9,5 7,-11-6,10 8,-10 0,4 0,-6 0,0 0,0 0,-5 0,3 0,-1 0,0 0,2 0,-3 0,0 0,1 0,-1 0,6 0,-7 0,6 0,-8 0,4 0,0 0,0 0,0 0,0 0,0 0</inkml:trace>
+</inkml:ink>
+</file>
+
+<file path=ppt/ink/ink9.xml><?xml version="1.0" encoding="utf-8"?>
+<inkml:ink xmlns:inkml="http://www.w3.org/2003/InkML">
+  <inkml:definitions>
+    <inkml:context xml:id="ctx0">
+      <inkml:inkSource xml:id="inkSrc0">
+        <inkml:traceFormat>
+          <inkml:channel name="X" type="integer" min="-2.14748E9" max="2.14748E9" units="cm"/>
+          <inkml:channel name="Y" type="integer" min="-2.14748E9" max="2.14748E9" units="cm"/>
+        </inkml:traceFormat>
+        <inkml:channelProperties>
+          <inkml:channelProperty channel="X" name="resolution" value="1000" units="1/cm"/>
+          <inkml:channelProperty channel="Y" name="resolution" value="1000" units="1/cm"/>
+        </inkml:channelProperties>
+      </inkml:inkSource>
+      <inkml:timestamp xml:id="ts0" timeString="2020-09-21T16:28:13.203"/>
+    </inkml:context>
+    <inkml:brush xml:id="br0">
+      <inkml:brushProperty name="width" value="0.3" units="cm"/>
+      <inkml:brushProperty name="height" value="0.6" units="cm"/>
+      <inkml:brushProperty name="color" value="#FF8517"/>
+      <inkml:brushProperty name="tip" value="rectangle"/>
+      <inkml:brushProperty name="rasterOp" value="maskPen"/>
+    </inkml:brush>
+  </inkml:definitions>
+  <inkml:trace contextRef="#ctx0" brushRef="#br0">1 23,'44'0,"2"0,-11 0,0 0,6 0,-14 0,12 0,-2 0,5 0,7 0,-6 0,8 0,-8-5,5 4,-13-4,6 5,-7 0,-1-5,-6 3,-2-3,-6 5,0 0,-5 0,4 0,0 0,-3 0,6 0,-7 0,0 0,4 0,-4 0,9 0,-3 0,-3 0,1 0,-4 0,5 0,0 0,1 0,-1 0,-5 0,2 0,0 0,4 0</inkml:trace>
+</inkml:ink>
+</file>
+
 <file path=ppt/notesMasters/notesMaster1.xml><?xml version="1.0" encoding="utf-8"?>
 <p:notesMaster xmlns:a="http://schemas.openxmlformats.org/drawingml/2006/main" xmlns:r="http://schemas.openxmlformats.org/officeDocument/2006/relationships" xmlns:p="http://schemas.openxmlformats.org/presentationml/2006/main">
   <p:cSld>
@@ -215,7 +552,7 @@
           <a:p>
             <a:fld id="{27DB5A6A-1371-5146-AEA0-9F3E6E323E0A}" type="datetimeFigureOut">
               <a:rPr lang="en-US" smtClean="0"/>
-              <a:t>9/17/20</a:t>
+              <a:t>9/21/20</a:t>
             </a:fld>
             <a:endParaRPr lang="en-US"/>
           </a:p>
@@ -482,180 +819,6 @@
 </p:notesMaster>
 </file>
 
-<file path=ppt/notesSlides/notesSlide1.xml><?xml version="1.0" encoding="utf-8"?>
-<p:notes xmlns:a="http://schemas.openxmlformats.org/drawingml/2006/main" xmlns:r="http://schemas.openxmlformats.org/officeDocument/2006/relationships" xmlns:p="http://schemas.openxmlformats.org/presentationml/2006/main">
-  <p:cSld>
-    <p:spTree>
-      <p:nvGrpSpPr>
-        <p:cNvPr id="1" name=""/>
-        <p:cNvGrpSpPr/>
-        <p:nvPr/>
-      </p:nvGrpSpPr>
-      <p:grpSpPr>
-        <a:xfrm>
-          <a:off x="0" y="0"/>
-          <a:ext cx="0" cy="0"/>
-          <a:chOff x="0" y="0"/>
-          <a:chExt cx="0" cy="0"/>
-        </a:xfrm>
-      </p:grpSpPr>
-      <p:sp>
-        <p:nvSpPr>
-          <p:cNvPr id="2" name="Slide Image Placeholder 1"/>
-          <p:cNvSpPr>
-            <a:spLocks noGrp="1" noRot="1" noChangeAspect="1"/>
-          </p:cNvSpPr>
-          <p:nvPr>
-            <p:ph type="sldImg"/>
-          </p:nvPr>
-        </p:nvSpPr>
-        <p:spPr/>
-      </p:sp>
-      <p:sp>
-        <p:nvSpPr>
-          <p:cNvPr id="3" name="Notes Placeholder 2"/>
-          <p:cNvSpPr>
-            <a:spLocks noGrp="1"/>
-          </p:cNvSpPr>
-          <p:nvPr>
-            <p:ph type="body" idx="1"/>
-          </p:nvPr>
-        </p:nvSpPr>
-        <p:spPr/>
-        <p:txBody>
-          <a:bodyPr/>
-          <a:lstStyle/>
-          <a:p>
-            <a:r>
-              <a:rPr lang="en-US" dirty="0"/>
-              <a:t>Final Model</a:t>
-            </a:r>
-          </a:p>
-        </p:txBody>
-      </p:sp>
-      <p:sp>
-        <p:nvSpPr>
-          <p:cNvPr id="4" name="Slide Number Placeholder 3"/>
-          <p:cNvSpPr>
-            <a:spLocks noGrp="1"/>
-          </p:cNvSpPr>
-          <p:nvPr>
-            <p:ph type="sldNum" sz="quarter" idx="5"/>
-          </p:nvPr>
-        </p:nvSpPr>
-        <p:spPr/>
-        <p:txBody>
-          <a:bodyPr/>
-          <a:lstStyle/>
-          <a:p>
-            <a:fld id="{99B6B02A-CE46-D845-B55E-67292777F91A}" type="slidenum">
-              <a:rPr lang="en-US" smtClean="0"/>
-              <a:t>17</a:t>
-            </a:fld>
-            <a:endParaRPr lang="en-US"/>
-          </a:p>
-        </p:txBody>
-      </p:sp>
-    </p:spTree>
-    <p:extLst>
-      <p:ext uri="{BB962C8B-B14F-4D97-AF65-F5344CB8AC3E}">
-        <p14:creationId xmlns:p14="http://schemas.microsoft.com/office/powerpoint/2010/main" val="87345335"/>
-      </p:ext>
-    </p:extLst>
-  </p:cSld>
-  <p:clrMapOvr>
-    <a:masterClrMapping/>
-  </p:clrMapOvr>
-</p:notes>
-</file>
-
-<file path=ppt/notesSlides/notesSlide2.xml><?xml version="1.0" encoding="utf-8"?>
-<p:notes xmlns:a="http://schemas.openxmlformats.org/drawingml/2006/main" xmlns:r="http://schemas.openxmlformats.org/officeDocument/2006/relationships" xmlns:p="http://schemas.openxmlformats.org/presentationml/2006/main">
-  <p:cSld>
-    <p:spTree>
-      <p:nvGrpSpPr>
-        <p:cNvPr id="1" name=""/>
-        <p:cNvGrpSpPr/>
-        <p:nvPr/>
-      </p:nvGrpSpPr>
-      <p:grpSpPr>
-        <a:xfrm>
-          <a:off x="0" y="0"/>
-          <a:ext cx="0" cy="0"/>
-          <a:chOff x="0" y="0"/>
-          <a:chExt cx="0" cy="0"/>
-        </a:xfrm>
-      </p:grpSpPr>
-      <p:sp>
-        <p:nvSpPr>
-          <p:cNvPr id="2" name="Slide Image Placeholder 1"/>
-          <p:cNvSpPr>
-            <a:spLocks noGrp="1" noRot="1" noChangeAspect="1"/>
-          </p:cNvSpPr>
-          <p:nvPr>
-            <p:ph type="sldImg"/>
-          </p:nvPr>
-        </p:nvSpPr>
-        <p:spPr/>
-      </p:sp>
-      <p:sp>
-        <p:nvSpPr>
-          <p:cNvPr id="3" name="Notes Placeholder 2"/>
-          <p:cNvSpPr>
-            <a:spLocks noGrp="1"/>
-          </p:cNvSpPr>
-          <p:nvPr>
-            <p:ph type="body" idx="1"/>
-          </p:nvPr>
-        </p:nvSpPr>
-        <p:spPr/>
-        <p:txBody>
-          <a:bodyPr/>
-          <a:lstStyle/>
-          <a:p>
-            <a:r>
-              <a:rPr lang="en-US" dirty="0"/>
-              <a:t>QQ-plot of the final model</a:t>
-            </a:r>
-          </a:p>
-        </p:txBody>
-      </p:sp>
-      <p:sp>
-        <p:nvSpPr>
-          <p:cNvPr id="4" name="Slide Number Placeholder 3"/>
-          <p:cNvSpPr>
-            <a:spLocks noGrp="1"/>
-          </p:cNvSpPr>
-          <p:nvPr>
-            <p:ph type="sldNum" sz="quarter" idx="5"/>
-          </p:nvPr>
-        </p:nvSpPr>
-        <p:spPr/>
-        <p:txBody>
-          <a:bodyPr/>
-          <a:lstStyle/>
-          <a:p>
-            <a:fld id="{99B6B02A-CE46-D845-B55E-67292777F91A}" type="slidenum">
-              <a:rPr lang="en-US" smtClean="0"/>
-              <a:t>18</a:t>
-            </a:fld>
-            <a:endParaRPr lang="en-US"/>
-          </a:p>
-        </p:txBody>
-      </p:sp>
-    </p:spTree>
-    <p:extLst>
-      <p:ext uri="{BB962C8B-B14F-4D97-AF65-F5344CB8AC3E}">
-        <p14:creationId xmlns:p14="http://schemas.microsoft.com/office/powerpoint/2010/main" val="1852673241"/>
-      </p:ext>
-    </p:extLst>
-  </p:cSld>
-  <p:clrMapOvr>
-    <a:masterClrMapping/>
-  </p:clrMapOvr>
-</p:notes>
-</file>
-
 <file path=ppt/slideLayouts/slideLayout1.xml><?xml version="1.0" encoding="utf-8"?>
 <p:sldLayout xmlns:a="http://schemas.openxmlformats.org/drawingml/2006/main" xmlns:r="http://schemas.openxmlformats.org/officeDocument/2006/relationships" xmlns:p="http://schemas.openxmlformats.org/presentationml/2006/main" type="title" preserve="1">
   <p:cSld name="Title Slide">
@@ -803,7 +966,7 @@
           <a:p>
             <a:fld id="{C92E1818-21AF-3F43-93C1-E522F1923028}" type="datetimeFigureOut">
               <a:rPr lang="en-US" smtClean="0"/>
-              <a:t>9/17/20</a:t>
+              <a:t>9/21/20</a:t>
             </a:fld>
             <a:endParaRPr lang="en-US"/>
           </a:p>
@@ -1001,7 +1164,7 @@
           <a:p>
             <a:fld id="{C92E1818-21AF-3F43-93C1-E522F1923028}" type="datetimeFigureOut">
               <a:rPr lang="en-US" smtClean="0"/>
-              <a:t>9/17/20</a:t>
+              <a:t>9/21/20</a:t>
             </a:fld>
             <a:endParaRPr lang="en-US"/>
           </a:p>
@@ -1209,7 +1372,7 @@
           <a:p>
             <a:fld id="{C92E1818-21AF-3F43-93C1-E522F1923028}" type="datetimeFigureOut">
               <a:rPr lang="en-US" smtClean="0"/>
-              <a:t>9/17/20</a:t>
+              <a:t>9/21/20</a:t>
             </a:fld>
             <a:endParaRPr lang="en-US"/>
           </a:p>
@@ -1407,7 +1570,7 @@
           <a:p>
             <a:fld id="{C92E1818-21AF-3F43-93C1-E522F1923028}" type="datetimeFigureOut">
               <a:rPr lang="en-US" smtClean="0"/>
-              <a:t>9/17/20</a:t>
+              <a:t>9/21/20</a:t>
             </a:fld>
             <a:endParaRPr lang="en-US"/>
           </a:p>
@@ -1682,7 +1845,7 @@
           <a:p>
             <a:fld id="{C92E1818-21AF-3F43-93C1-E522F1923028}" type="datetimeFigureOut">
               <a:rPr lang="en-US" smtClean="0"/>
-              <a:t>9/17/20</a:t>
+              <a:t>9/21/20</a:t>
             </a:fld>
             <a:endParaRPr lang="en-US"/>
           </a:p>
@@ -1947,7 +2110,7 @@
           <a:p>
             <a:fld id="{C92E1818-21AF-3F43-93C1-E522F1923028}" type="datetimeFigureOut">
               <a:rPr lang="en-US" smtClean="0"/>
-              <a:t>9/17/20</a:t>
+              <a:t>9/21/20</a:t>
             </a:fld>
             <a:endParaRPr lang="en-US"/>
           </a:p>
@@ -2359,7 +2522,7 @@
           <a:p>
             <a:fld id="{C92E1818-21AF-3F43-93C1-E522F1923028}" type="datetimeFigureOut">
               <a:rPr lang="en-US" smtClean="0"/>
-              <a:t>9/17/20</a:t>
+              <a:t>9/21/20</a:t>
             </a:fld>
             <a:endParaRPr lang="en-US"/>
           </a:p>
@@ -2500,7 +2663,7 @@
           <a:p>
             <a:fld id="{C92E1818-21AF-3F43-93C1-E522F1923028}" type="datetimeFigureOut">
               <a:rPr lang="en-US" smtClean="0"/>
-              <a:t>9/17/20</a:t>
+              <a:t>9/21/20</a:t>
             </a:fld>
             <a:endParaRPr lang="en-US"/>
           </a:p>
@@ -2613,7 +2776,7 @@
           <a:p>
             <a:fld id="{C92E1818-21AF-3F43-93C1-E522F1923028}" type="datetimeFigureOut">
               <a:rPr lang="en-US" smtClean="0"/>
-              <a:t>9/17/20</a:t>
+              <a:t>9/21/20</a:t>
             </a:fld>
             <a:endParaRPr lang="en-US"/>
           </a:p>
@@ -2924,7 +3087,7 @@
           <a:p>
             <a:fld id="{C92E1818-21AF-3F43-93C1-E522F1923028}" type="datetimeFigureOut">
               <a:rPr lang="en-US" smtClean="0"/>
-              <a:t>9/17/20</a:t>
+              <a:t>9/21/20</a:t>
             </a:fld>
             <a:endParaRPr lang="en-US"/>
           </a:p>
@@ -3212,7 +3375,7 @@
           <a:p>
             <a:fld id="{C92E1818-21AF-3F43-93C1-E522F1923028}" type="datetimeFigureOut">
               <a:rPr lang="en-US" smtClean="0"/>
-              <a:t>9/17/20</a:t>
+              <a:t>9/21/20</a:t>
             </a:fld>
             <a:endParaRPr lang="en-US"/>
           </a:p>
@@ -3458,7 +3621,7 @@
             <a:fld id="{C92E1818-21AF-3F43-93C1-E522F1923028}" type="datetimeFigureOut">
               <a:rPr lang="en-US" smtClean="0"/>
               <a:pPr/>
-              <a:t>9/17/20</a:t>
+              <a:t>9/21/20</a:t>
             </a:fld>
             <a:endParaRPr lang="en-US"/>
           </a:p>
@@ -5525,7 +5688,12 @@
             <p:ph idx="1"/>
           </p:nvPr>
         </p:nvSpPr>
-        <p:spPr/>
+        <p:spPr>
+          <a:xfrm>
+            <a:off x="838200" y="1825624"/>
+            <a:ext cx="10515600" cy="5032375"/>
+          </a:xfrm>
+        </p:spPr>
         <p:txBody>
           <a:bodyPr>
             <a:normAutofit/>
@@ -5534,7 +5702,15 @@
           <a:p>
             <a:r>
               <a:rPr lang="en-US" dirty="0"/>
-              <a:t>Model is limited</a:t>
+              <a:t>Model is limited in accuracy (R</a:t>
+            </a:r>
+            <a:r>
+              <a:rPr lang="en-US" baseline="30000" dirty="0"/>
+              <a:t>2</a:t>
+            </a:r>
+            <a:r>
+              <a:rPr lang="en-US" dirty="0"/>
+              <a:t> = 0.725)</a:t>
             </a:r>
           </a:p>
           <a:p>
@@ -5590,6 +5766,20 @@
             <a:r>
               <a:rPr lang="en-US" dirty="0"/>
               <a:t>increase number of bathrooms and bedrooms in total</a:t>
+            </a:r>
+          </a:p>
+          <a:p>
+            <a:pPr lvl="2"/>
+            <a:r>
+              <a:rPr lang="en-US" dirty="0"/>
+              <a:t>sell in the winter season</a:t>
+            </a:r>
+          </a:p>
+          <a:p>
+            <a:pPr lvl="2"/>
+            <a:r>
+              <a:rPr lang="en-US" dirty="0"/>
+              <a:t>sell during high mortgage rate</a:t>
             </a:r>
           </a:p>
           <a:p>
@@ -5696,6 +5886,40 @@
           </a:bodyPr>
           <a:lstStyle/>
           <a:p>
+            <a:r>
+              <a:rPr lang="en-US" dirty="0"/>
+              <a:t>The following features could be added to increase the accuracy of the model:</a:t>
+            </a:r>
+          </a:p>
+          <a:p>
+            <a:pPr lvl="1"/>
+            <a:r>
+              <a:rPr lang="en-US" dirty="0"/>
+              <a:t>school district for elementary, middle and high school rating</a:t>
+            </a:r>
+          </a:p>
+          <a:p>
+            <a:pPr lvl="1"/>
+            <a:r>
+              <a:rPr lang="en-US" dirty="0"/>
+              <a:t>average traffic time to major attractions</a:t>
+            </a:r>
+          </a:p>
+          <a:p>
+            <a:pPr lvl="1"/>
+            <a:r>
+              <a:rPr lang="en-US" dirty="0"/>
+              <a:t>noise level </a:t>
+            </a:r>
+          </a:p>
+          <a:p>
+            <a:pPr lvl="1"/>
+            <a:r>
+              <a:rPr lang="en-US" dirty="0"/>
+              <a:t>flood factors</a:t>
+            </a:r>
+          </a:p>
+          <a:p>
             <a:endParaRPr lang="en-US" dirty="0"/>
           </a:p>
         </p:txBody>
@@ -5919,7 +6143,7 @@
           <p:cNvPr id="2" name="Title 1">
             <a:extLst>
               <a:ext uri="{FF2B5EF4-FFF2-40B4-BE49-F238E27FC236}">
-                <a16:creationId xmlns:a16="http://schemas.microsoft.com/office/drawing/2014/main" id="{B9AD5557-76A3-1E4E-81DA-BE850E28F954}"/>
+                <a16:creationId xmlns:a16="http://schemas.microsoft.com/office/drawing/2014/main" id="{A659F140-4CBC-734C-99A0-82B5098D0E22}"/>
               </a:ext>
             </a:extLst>
           </p:cNvPr>
@@ -5930,46 +6154,30 @@
             <p:ph type="title"/>
           </p:nvPr>
         </p:nvSpPr>
-        <p:spPr/>
+        <p:spPr>
+          <a:xfrm>
+            <a:off x="838200" y="365125"/>
+            <a:ext cx="10515600" cy="1325563"/>
+          </a:xfrm>
+        </p:spPr>
         <p:txBody>
           <a:bodyPr/>
           <a:lstStyle/>
           <a:p>
-            <a:endParaRPr lang="en-US"/>
-          </a:p>
-        </p:txBody>
-      </p:sp>
-      <p:sp>
-        <p:nvSpPr>
-          <p:cNvPr id="3" name="Content Placeholder 2">
-            <a:extLst>
-              <a:ext uri="{FF2B5EF4-FFF2-40B4-BE49-F238E27FC236}">
-                <a16:creationId xmlns:a16="http://schemas.microsoft.com/office/drawing/2014/main" id="{A84D162E-544D-E54F-BA1E-2F74622085A0}"/>
-              </a:ext>
-            </a:extLst>
-          </p:cNvPr>
-          <p:cNvSpPr>
-            <a:spLocks noGrp="1"/>
-          </p:cNvSpPr>
-          <p:nvPr>
-            <p:ph idx="1"/>
-          </p:nvPr>
-        </p:nvSpPr>
-        <p:spPr/>
-        <p:txBody>
-          <a:bodyPr/>
-          <a:lstStyle/>
-          <a:p>
-            <a:endParaRPr lang="en-US"/>
+            <a:pPr algn="ctr"/>
+            <a:r>
+              <a:rPr lang="en-US" dirty="0"/>
+              <a:t>Price vs. Bathroom x grade</a:t>
+            </a:r>
           </a:p>
         </p:txBody>
       </p:sp>
       <p:pic>
         <p:nvPicPr>
-          <p:cNvPr id="4" name="Picture 4">
-            <a:extLst>
-              <a:ext uri="{FF2B5EF4-FFF2-40B4-BE49-F238E27FC236}">
-                <a16:creationId xmlns:a16="http://schemas.microsoft.com/office/drawing/2014/main" id="{82BFFC8F-B0EF-8A4E-84AF-03A08E300562}"/>
+          <p:cNvPr id="5122" name="Picture 2">
+            <a:extLst>
+              <a:ext uri="{FF2B5EF4-FFF2-40B4-BE49-F238E27FC236}">
+                <a16:creationId xmlns:a16="http://schemas.microsoft.com/office/drawing/2014/main" id="{0CA23440-5E6C-A648-9EB6-FC6A375D057F}"/>
               </a:ext>
             </a:extLst>
           </p:cNvPr>
@@ -5993,8 +6201,8 @@
         </p:blipFill>
         <p:spPr bwMode="auto">
           <a:xfrm>
-            <a:off x="1381210" y="195127"/>
-            <a:ext cx="8969506" cy="6467746"/>
+            <a:off x="2121776" y="1502182"/>
+            <a:ext cx="7948448" cy="5405895"/>
           </a:xfrm>
           <a:prstGeom prst="rect">
             <a:avLst/>
@@ -6014,7 +6222,7 @@
     </p:spTree>
     <p:extLst>
       <p:ext uri="{BB962C8B-B14F-4D97-AF65-F5344CB8AC3E}">
-        <p14:creationId xmlns:p14="http://schemas.microsoft.com/office/powerpoint/2010/main" val="852076515"/>
+        <p14:creationId xmlns:p14="http://schemas.microsoft.com/office/powerpoint/2010/main" val="2631820667"/>
       </p:ext>
     </p:extLst>
   </p:cSld>
@@ -6041,40 +6249,91 @@
           <a:chExt cx="0" cy="0"/>
         </a:xfrm>
       </p:grpSpPr>
+      <p:sp>
+        <p:nvSpPr>
+          <p:cNvPr id="2" name="Title 1">
+            <a:extLst>
+              <a:ext uri="{FF2B5EF4-FFF2-40B4-BE49-F238E27FC236}">
+                <a16:creationId xmlns:a16="http://schemas.microsoft.com/office/drawing/2014/main" id="{A659F140-4CBC-734C-99A0-82B5098D0E22}"/>
+              </a:ext>
+            </a:extLst>
+          </p:cNvPr>
+          <p:cNvSpPr>
+            <a:spLocks noGrp="1"/>
+          </p:cNvSpPr>
+          <p:nvPr>
+            <p:ph type="title"/>
+          </p:nvPr>
+        </p:nvSpPr>
+        <p:spPr>
+          <a:xfrm>
+            <a:off x="838200" y="365125"/>
+            <a:ext cx="10515600" cy="1325563"/>
+          </a:xfrm>
+        </p:spPr>
+        <p:txBody>
+          <a:bodyPr/>
+          <a:lstStyle/>
+          <a:p>
+            <a:pPr algn="ctr"/>
+            <a:r>
+              <a:rPr lang="en-US" dirty="0"/>
+              <a:t>Price vs. Distance from MS HQ</a:t>
+            </a:r>
+          </a:p>
+        </p:txBody>
+      </p:sp>
       <p:pic>
         <p:nvPicPr>
-          <p:cNvPr id="5" name="Picture 4">
-            <a:extLst>
-              <a:ext uri="{FF2B5EF4-FFF2-40B4-BE49-F238E27FC236}">
-                <a16:creationId xmlns:a16="http://schemas.microsoft.com/office/drawing/2014/main" id="{3C21AA95-42B2-C844-86A6-F9F0786FDB1B}"/>
+          <p:cNvPr id="6146" name="Picture 2">
+            <a:extLst>
+              <a:ext uri="{FF2B5EF4-FFF2-40B4-BE49-F238E27FC236}">
+                <a16:creationId xmlns:a16="http://schemas.microsoft.com/office/drawing/2014/main" id="{99A43213-EA2D-3746-B12E-3D2F0DE5F49B}"/>
               </a:ext>
             </a:extLst>
           </p:cNvPr>
           <p:cNvPicPr>
-            <a:picLocks noChangeAspect="1"/>
+            <a:picLocks noChangeAspect="1" noChangeArrowheads="1"/>
           </p:cNvPicPr>
           <p:nvPr/>
         </p:nvPicPr>
         <p:blipFill>
-          <a:blip r:embed="rId3"/>
+          <a:blip r:embed="rId2">
+            <a:extLst>
+              <a:ext uri="{28A0092B-C50C-407E-A947-70E740481C1C}">
+                <a14:useLocalDpi xmlns:a14="http://schemas.microsoft.com/office/drawing/2010/main" val="0"/>
+              </a:ext>
+            </a:extLst>
+          </a:blip>
+          <a:srcRect/>
           <a:stretch>
             <a:fillRect/>
           </a:stretch>
         </p:blipFill>
-        <p:spPr>
+        <p:spPr bwMode="auto">
           <a:xfrm>
-            <a:off x="3776898" y="0"/>
-            <a:ext cx="4638204" cy="6858000"/>
+            <a:off x="2194582" y="1566956"/>
+            <a:ext cx="7802836" cy="5291044"/>
           </a:xfrm>
           <a:prstGeom prst="rect">
             <a:avLst/>
           </a:prstGeom>
+          <a:noFill/>
+          <a:extLst>
+            <a:ext uri="{909E8E84-426E-40DD-AFC4-6F175D3DCCD1}">
+              <a14:hiddenFill xmlns:a14="http://schemas.microsoft.com/office/drawing/2010/main">
+                <a:solidFill>
+                  <a:srgbClr val="FFFFFF"/>
+                </a:solidFill>
+              </a14:hiddenFill>
+            </a:ext>
+          </a:extLst>
         </p:spPr>
       </p:pic>
     </p:spTree>
     <p:extLst>
       <p:ext uri="{BB962C8B-B14F-4D97-AF65-F5344CB8AC3E}">
-        <p14:creationId xmlns:p14="http://schemas.microsoft.com/office/powerpoint/2010/main" val="4011519350"/>
+        <p14:creationId xmlns:p14="http://schemas.microsoft.com/office/powerpoint/2010/main" val="200462871"/>
       </p:ext>
     </p:extLst>
   </p:cSld>
@@ -6106,7 +6365,7 @@
           <p:cNvPr id="2" name="Title 1">
             <a:extLst>
               <a:ext uri="{FF2B5EF4-FFF2-40B4-BE49-F238E27FC236}">
-                <a16:creationId xmlns:a16="http://schemas.microsoft.com/office/drawing/2014/main" id="{A36B0185-61A0-C945-8782-838D96713E8E}"/>
+                <a16:creationId xmlns:a16="http://schemas.microsoft.com/office/drawing/2014/main" id="{A659F140-4CBC-734C-99A0-82B5098D0E22}"/>
               </a:ext>
             </a:extLst>
           </p:cNvPr>
@@ -6117,46 +6376,32 @@
             <p:ph type="title"/>
           </p:nvPr>
         </p:nvSpPr>
-        <p:spPr/>
-        <p:txBody>
-          <a:bodyPr/>
-          <a:lstStyle/>
-          <a:p>
-            <a:endParaRPr lang="en-US"/>
-          </a:p>
-        </p:txBody>
-      </p:sp>
-      <p:sp>
-        <p:nvSpPr>
-          <p:cNvPr id="3" name="Content Placeholder 2">
-            <a:extLst>
-              <a:ext uri="{FF2B5EF4-FFF2-40B4-BE49-F238E27FC236}">
-                <a16:creationId xmlns:a16="http://schemas.microsoft.com/office/drawing/2014/main" id="{E77AEEB5-28FE-EE48-B16E-A1121F597171}"/>
-              </a:ext>
-            </a:extLst>
-          </p:cNvPr>
-          <p:cNvSpPr>
-            <a:spLocks noGrp="1"/>
-          </p:cNvSpPr>
-          <p:nvPr>
-            <p:ph idx="1"/>
-          </p:nvPr>
-        </p:nvSpPr>
-        <p:spPr/>
-        <p:txBody>
-          <a:bodyPr/>
-          <a:lstStyle/>
-          <a:p>
-            <a:endParaRPr lang="en-US"/>
+        <p:spPr>
+          <a:xfrm>
+            <a:off x="838200" y="365125"/>
+            <a:ext cx="10515600" cy="1325563"/>
+          </a:xfrm>
+        </p:spPr>
+        <p:txBody>
+          <a:bodyPr>
+            <a:normAutofit/>
+          </a:bodyPr>
+          <a:lstStyle/>
+          <a:p>
+            <a:pPr algn="ctr"/>
+            <a:r>
+              <a:rPr lang="en-US" sz="3600" dirty="0"/>
+              <a:t>Price vs. Average distance from main attractions</a:t>
+            </a:r>
           </a:p>
         </p:txBody>
       </p:sp>
       <p:pic>
         <p:nvPicPr>
-          <p:cNvPr id="4098" name="Picture 2">
-            <a:extLst>
-              <a:ext uri="{FF2B5EF4-FFF2-40B4-BE49-F238E27FC236}">
-                <a16:creationId xmlns:a16="http://schemas.microsoft.com/office/drawing/2014/main" id="{81FF1819-6695-854A-94BA-72AB9847E708}"/>
+          <p:cNvPr id="7170" name="Picture 2">
+            <a:extLst>
+              <a:ext uri="{FF2B5EF4-FFF2-40B4-BE49-F238E27FC236}">
+                <a16:creationId xmlns:a16="http://schemas.microsoft.com/office/drawing/2014/main" id="{AF38EA8D-4CCC-E047-BB9F-F63505D0E08C}"/>
               </a:ext>
             </a:extLst>
           </p:cNvPr>
@@ -6166,7 +6411,7 @@
           <p:nvPr/>
         </p:nvPicPr>
         <p:blipFill>
-          <a:blip r:embed="rId3">
+          <a:blip r:embed="rId2">
             <a:extLst>
               <a:ext uri="{28A0092B-C50C-407E-A947-70E740481C1C}">
                 <a14:useLocalDpi xmlns:a14="http://schemas.microsoft.com/office/drawing/2010/main" val="0"/>
@@ -6180,8 +6425,8 @@
         </p:blipFill>
         <p:spPr bwMode="auto">
           <a:xfrm>
-            <a:off x="1016000" y="0"/>
-            <a:ext cx="10160000" cy="6858000"/>
+            <a:off x="2092434" y="1500287"/>
+            <a:ext cx="8007131" cy="5357713"/>
           </a:xfrm>
           <a:prstGeom prst="rect">
             <a:avLst/>
@@ -6201,7 +6446,7 @@
     </p:spTree>
     <p:extLst>
       <p:ext uri="{BB962C8B-B14F-4D97-AF65-F5344CB8AC3E}">
-        <p14:creationId xmlns:p14="http://schemas.microsoft.com/office/powerpoint/2010/main" val="698981493"/>
+        <p14:creationId xmlns:p14="http://schemas.microsoft.com/office/powerpoint/2010/main" val="3569356738"/>
       </p:ext>
     </p:extLst>
   </p:cSld>
@@ -6233,7 +6478,7 @@
           <p:cNvPr id="2" name="Title 1">
             <a:extLst>
               <a:ext uri="{FF2B5EF4-FFF2-40B4-BE49-F238E27FC236}">
-                <a16:creationId xmlns:a16="http://schemas.microsoft.com/office/drawing/2014/main" id="{14525E81-7280-BF4C-8B23-ADE7F52CFA8A}"/>
+                <a16:creationId xmlns:a16="http://schemas.microsoft.com/office/drawing/2014/main" id="{B6AD9136-C689-144E-8A7E-D3B18D773EB2}"/>
               </a:ext>
             </a:extLst>
           </p:cNvPr>
@@ -6258,7 +6503,7 @@
           <p:cNvPr id="3" name="Content Placeholder 2">
             <a:extLst>
               <a:ext uri="{FF2B5EF4-FFF2-40B4-BE49-F238E27FC236}">
-                <a16:creationId xmlns:a16="http://schemas.microsoft.com/office/drawing/2014/main" id="{119DEF3B-DEFE-9A45-9A1B-448681ABD6B5}"/>
+                <a16:creationId xmlns:a16="http://schemas.microsoft.com/office/drawing/2014/main" id="{A74997E9-AB39-E141-B8A3-D15794E59A07}"/>
               </a:ext>
             </a:extLst>
           </p:cNvPr>
@@ -6280,10 +6525,10 @@
       </p:sp>
       <p:pic>
         <p:nvPicPr>
-          <p:cNvPr id="5122" name="Picture 2">
-            <a:extLst>
-              <a:ext uri="{FF2B5EF4-FFF2-40B4-BE49-F238E27FC236}">
-                <a16:creationId xmlns:a16="http://schemas.microsoft.com/office/drawing/2014/main" id="{460786C1-3388-A74C-AACF-832B04399191}"/>
+          <p:cNvPr id="4098" name="Picture 2">
+            <a:extLst>
+              <a:ext uri="{FF2B5EF4-FFF2-40B4-BE49-F238E27FC236}">
+                <a16:creationId xmlns:a16="http://schemas.microsoft.com/office/drawing/2014/main" id="{864764AE-1FF6-024E-91FF-AC5607F84FA9}"/>
               </a:ext>
             </a:extLst>
           </p:cNvPr>
@@ -6307,8 +6552,8 @@
         </p:blipFill>
         <p:spPr bwMode="auto">
           <a:xfrm>
-            <a:off x="957263" y="0"/>
-            <a:ext cx="10277475" cy="6858000"/>
+            <a:off x="1138238" y="0"/>
+            <a:ext cx="9915525" cy="6858000"/>
           </a:xfrm>
           <a:prstGeom prst="rect">
             <a:avLst/>
@@ -6328,7 +6573,7 @@
     </p:spTree>
     <p:extLst>
       <p:ext uri="{BB962C8B-B14F-4D97-AF65-F5344CB8AC3E}">
-        <p14:creationId xmlns:p14="http://schemas.microsoft.com/office/powerpoint/2010/main" val="4074866472"/>
+        <p14:creationId xmlns:p14="http://schemas.microsoft.com/office/powerpoint/2010/main" val="2314122229"/>
       </p:ext>
     </p:extLst>
   </p:cSld>
@@ -6401,25 +6646,31 @@
         </p:nvSpPr>
         <p:spPr>
           <a:xfrm>
-            <a:off x="356248" y="4953837"/>
-            <a:ext cx="5739752" cy="1709035"/>
+            <a:off x="356248" y="5231219"/>
+            <a:ext cx="11265138" cy="1431653"/>
           </a:xfrm>
         </p:spPr>
         <p:txBody>
           <a:bodyPr>
-            <a:normAutofit fontScale="92500"/>
+            <a:normAutofit lnSpcReduction="10000"/>
           </a:bodyPr>
           <a:lstStyle/>
           <a:p>
             <a:r>
               <a:rPr lang="en-US" dirty="0"/>
-              <a:t>House sale is a huge even during recessions (around $1B each month)</a:t>
+              <a:t>House sales market is huge – around billions in each season</a:t>
             </a:r>
           </a:p>
           <a:p>
             <a:r>
               <a:rPr lang="en-US" dirty="0"/>
-              <a:t> House prices differ depending on various factors (ex. location)</a:t>
+              <a:t>There are different factors that could affect house price</a:t>
+            </a:r>
+          </a:p>
+          <a:p>
+            <a:r>
+              <a:rPr lang="en-US" dirty="0"/>
+              <a:t>Example. Time/seasonal factor</a:t>
             </a:r>
           </a:p>
           <a:p>
@@ -6432,10 +6683,10 @@
       </p:sp>
       <p:pic>
         <p:nvPicPr>
-          <p:cNvPr id="1028" name="Picture 4">
-            <a:extLst>
-              <a:ext uri="{FF2B5EF4-FFF2-40B4-BE49-F238E27FC236}">
-                <a16:creationId xmlns:a16="http://schemas.microsoft.com/office/drawing/2014/main" id="{8974B78F-248B-8D48-8972-671597A12B94}"/>
+          <p:cNvPr id="4" name="Picture 4">
+            <a:extLst>
+              <a:ext uri="{FF2B5EF4-FFF2-40B4-BE49-F238E27FC236}">
+                <a16:creationId xmlns:a16="http://schemas.microsoft.com/office/drawing/2014/main" id="{7926C58F-9E29-264A-A50E-CE55A257F8AD}"/>
               </a:ext>
             </a:extLst>
           </p:cNvPr>
@@ -6459,8 +6710,8 @@
         </p:blipFill>
         <p:spPr bwMode="auto">
           <a:xfrm>
-            <a:off x="6245684" y="195127"/>
-            <a:ext cx="8969506" cy="6467746"/>
+            <a:off x="494473" y="1495154"/>
+            <a:ext cx="5179624" cy="3694176"/>
           </a:xfrm>
           <a:prstGeom prst="rect">
             <a:avLst/>
@@ -6479,10 +6730,10 @@
       </p:pic>
       <p:pic>
         <p:nvPicPr>
-          <p:cNvPr id="5" name="Picture 6">
-            <a:extLst>
-              <a:ext uri="{FF2B5EF4-FFF2-40B4-BE49-F238E27FC236}">
-                <a16:creationId xmlns:a16="http://schemas.microsoft.com/office/drawing/2014/main" id="{4EC82A3E-F165-7B45-BDEE-B21296CADFA0}"/>
+          <p:cNvPr id="11" name="Picture 8">
+            <a:extLst>
+              <a:ext uri="{FF2B5EF4-FFF2-40B4-BE49-F238E27FC236}">
+                <a16:creationId xmlns:a16="http://schemas.microsoft.com/office/drawing/2014/main" id="{A2DB208C-EA04-794A-B434-7CB5AE5678AB}"/>
               </a:ext>
             </a:extLst>
           </p:cNvPr>
@@ -6506,8 +6757,8 @@
         </p:blipFill>
         <p:spPr bwMode="auto">
           <a:xfrm>
-            <a:off x="356248" y="1544951"/>
-            <a:ext cx="5739752" cy="3175736"/>
+            <a:off x="5941091" y="1495154"/>
+            <a:ext cx="5463449" cy="3694176"/>
           </a:xfrm>
           <a:prstGeom prst="rect">
             <a:avLst/>
@@ -6549,6 +6800,133 @@
 </p:sld>
 </file>
 
+<file path=ppt/slides/slide20.xml><?xml version="1.0" encoding="utf-8"?>
+<p:sld xmlns:a="http://schemas.openxmlformats.org/drawingml/2006/main" xmlns:r="http://schemas.openxmlformats.org/officeDocument/2006/relationships" xmlns:p="http://schemas.openxmlformats.org/presentationml/2006/main">
+  <p:cSld>
+    <p:spTree>
+      <p:nvGrpSpPr>
+        <p:cNvPr id="1" name=""/>
+        <p:cNvGrpSpPr/>
+        <p:nvPr/>
+      </p:nvGrpSpPr>
+      <p:grpSpPr>
+        <a:xfrm>
+          <a:off x="0" y="0"/>
+          <a:ext cx="0" cy="0"/>
+          <a:chOff x="0" y="0"/>
+          <a:chExt cx="0" cy="0"/>
+        </a:xfrm>
+      </p:grpSpPr>
+      <p:sp>
+        <p:nvSpPr>
+          <p:cNvPr id="2" name="Title 1">
+            <a:extLst>
+              <a:ext uri="{FF2B5EF4-FFF2-40B4-BE49-F238E27FC236}">
+                <a16:creationId xmlns:a16="http://schemas.microsoft.com/office/drawing/2014/main" id="{F48621D1-B61C-594A-BF61-F41C19732E52}"/>
+              </a:ext>
+            </a:extLst>
+          </p:cNvPr>
+          <p:cNvSpPr>
+            <a:spLocks noGrp="1"/>
+          </p:cNvSpPr>
+          <p:nvPr>
+            <p:ph type="title"/>
+          </p:nvPr>
+        </p:nvSpPr>
+        <p:spPr/>
+        <p:txBody>
+          <a:bodyPr/>
+          <a:lstStyle/>
+          <a:p>
+            <a:endParaRPr lang="en-US"/>
+          </a:p>
+        </p:txBody>
+      </p:sp>
+      <p:sp>
+        <p:nvSpPr>
+          <p:cNvPr id="3" name="Content Placeholder 2">
+            <a:extLst>
+              <a:ext uri="{FF2B5EF4-FFF2-40B4-BE49-F238E27FC236}">
+                <a16:creationId xmlns:a16="http://schemas.microsoft.com/office/drawing/2014/main" id="{EDA14A90-FCD1-B34B-8856-814FED844FF0}"/>
+              </a:ext>
+            </a:extLst>
+          </p:cNvPr>
+          <p:cNvSpPr>
+            <a:spLocks noGrp="1"/>
+          </p:cNvSpPr>
+          <p:nvPr>
+            <p:ph idx="1"/>
+          </p:nvPr>
+        </p:nvSpPr>
+        <p:spPr/>
+        <p:txBody>
+          <a:bodyPr/>
+          <a:lstStyle/>
+          <a:p>
+            <a:endParaRPr lang="en-US"/>
+          </a:p>
+        </p:txBody>
+      </p:sp>
+      <p:pic>
+        <p:nvPicPr>
+          <p:cNvPr id="3074" name="Picture 2">
+            <a:extLst>
+              <a:ext uri="{FF2B5EF4-FFF2-40B4-BE49-F238E27FC236}">
+                <a16:creationId xmlns:a16="http://schemas.microsoft.com/office/drawing/2014/main" id="{72CE9B64-464E-2442-B84D-FCD3D2A25739}"/>
+              </a:ext>
+            </a:extLst>
+          </p:cNvPr>
+          <p:cNvPicPr>
+            <a:picLocks noChangeAspect="1" noChangeArrowheads="1"/>
+          </p:cNvPicPr>
+          <p:nvPr/>
+        </p:nvPicPr>
+        <p:blipFill>
+          <a:blip r:embed="rId2">
+            <a:extLst>
+              <a:ext uri="{28A0092B-C50C-407E-A947-70E740481C1C}">
+                <a14:useLocalDpi xmlns:a14="http://schemas.microsoft.com/office/drawing/2010/main" val="0"/>
+              </a:ext>
+            </a:extLst>
+          </a:blip>
+          <a:srcRect/>
+          <a:stretch>
+            <a:fillRect/>
+          </a:stretch>
+        </p:blipFill>
+        <p:spPr bwMode="auto">
+          <a:xfrm>
+            <a:off x="1055688" y="0"/>
+            <a:ext cx="10080625" cy="6858000"/>
+          </a:xfrm>
+          <a:prstGeom prst="rect">
+            <a:avLst/>
+          </a:prstGeom>
+          <a:noFill/>
+          <a:extLst>
+            <a:ext uri="{909E8E84-426E-40DD-AFC4-6F175D3DCCD1}">
+              <a14:hiddenFill xmlns:a14="http://schemas.microsoft.com/office/drawing/2010/main">
+                <a:solidFill>
+                  <a:srgbClr val="FFFFFF"/>
+                </a:solidFill>
+              </a14:hiddenFill>
+            </a:ext>
+          </a:extLst>
+        </p:spPr>
+      </p:pic>
+    </p:spTree>
+    <p:extLst>
+      <p:ext uri="{BB962C8B-B14F-4D97-AF65-F5344CB8AC3E}">
+        <p14:creationId xmlns:p14="http://schemas.microsoft.com/office/powerpoint/2010/main" val="165354975"/>
+      </p:ext>
+    </p:extLst>
+  </p:cSld>
+  <p:clrMapOvr>
+    <a:masterClrMapping/>
+  </p:clrMapOvr>
+</p:sld>
+</file>
+
 <file path=ppt/slides/slide3.xml><?xml version="1.0" encoding="utf-8"?>
 <p:sld xmlns:a="http://schemas.openxmlformats.org/drawingml/2006/main" xmlns:r="http://schemas.openxmlformats.org/officeDocument/2006/relationships" xmlns:p="http://schemas.openxmlformats.org/presentationml/2006/main">
   <p:cSld>
@@ -6568,38 +6946,10 @@
       </p:grpSpPr>
       <p:sp>
         <p:nvSpPr>
-          <p:cNvPr id="2" name="Title 1">
-            <a:extLst>
-              <a:ext uri="{FF2B5EF4-FFF2-40B4-BE49-F238E27FC236}">
-                <a16:creationId xmlns:a16="http://schemas.microsoft.com/office/drawing/2014/main" id="{D7505700-4689-5F44-9538-0CB7ADD2393F}"/>
-              </a:ext>
-            </a:extLst>
-          </p:cNvPr>
-          <p:cNvSpPr>
-            <a:spLocks noGrp="1"/>
-          </p:cNvSpPr>
-          <p:nvPr>
-            <p:ph type="title"/>
-          </p:nvPr>
-        </p:nvSpPr>
-        <p:spPr/>
-        <p:txBody>
-          <a:bodyPr/>
-          <a:lstStyle/>
-          <a:p>
-            <a:r>
-              <a:rPr lang="en-US" dirty="0"/>
-              <a:t>Question 1</a:t>
-            </a:r>
-          </a:p>
-        </p:txBody>
-      </p:sp>
-      <p:sp>
-        <p:nvSpPr>
           <p:cNvPr id="3" name="Content Placeholder 2">
             <a:extLst>
               <a:ext uri="{FF2B5EF4-FFF2-40B4-BE49-F238E27FC236}">
-                <a16:creationId xmlns:a16="http://schemas.microsoft.com/office/drawing/2014/main" id="{3FBFC376-5AC6-B646-8D3C-BDAA8EA0D2AE}"/>
+                <a16:creationId xmlns:a16="http://schemas.microsoft.com/office/drawing/2014/main" id="{B0E357E9-DAF4-9843-A1CB-ACD57A42FFA7}"/>
               </a:ext>
             </a:extLst>
           </p:cNvPr>
@@ -6610,357 +6960,37 @@
             <p:ph idx="1"/>
           </p:nvPr>
         </p:nvSpPr>
-        <p:spPr/>
+        <p:spPr>
+          <a:xfrm>
+            <a:off x="229390" y="5312980"/>
+            <a:ext cx="3668110" cy="1282262"/>
+          </a:xfrm>
+        </p:spPr>
         <p:txBody>
           <a:bodyPr>
             <a:normAutofit/>
           </a:bodyPr>
           <a:lstStyle/>
           <a:p>
+            <a:r>
+              <a:rPr lang="en-US" dirty="0"/>
+              <a:t>Geographical factor</a:t>
+            </a:r>
+          </a:p>
+          <a:p>
             <a:pPr marL="0" indent="0">
               <a:buNone/>
             </a:pPr>
-            <a:r>
-              <a:rPr lang="en-US" sz="4000" dirty="0"/>
-              <a:t>What factors affect the house prices the most in most interpretable and reasonable way?</a:t>
-            </a:r>
-          </a:p>
-        </p:txBody>
-      </p:sp>
-    </p:spTree>
-    <p:extLst>
-      <p:ext uri="{BB962C8B-B14F-4D97-AF65-F5344CB8AC3E}">
-        <p14:creationId xmlns:p14="http://schemas.microsoft.com/office/powerpoint/2010/main" val="4109023319"/>
-      </p:ext>
-    </p:extLst>
-  </p:cSld>
-  <p:clrMapOvr>
-    <a:masterClrMapping/>
-  </p:clrMapOvr>
-</p:sld>
-</file>
-
-<file path=ppt/slides/slide4.xml><?xml version="1.0" encoding="utf-8"?>
-<p:sld xmlns:a="http://schemas.openxmlformats.org/drawingml/2006/main" xmlns:r="http://schemas.openxmlformats.org/officeDocument/2006/relationships" xmlns:p="http://schemas.openxmlformats.org/presentationml/2006/main">
-  <p:cSld>
-    <p:spTree>
-      <p:nvGrpSpPr>
-        <p:cNvPr id="1" name=""/>
-        <p:cNvGrpSpPr/>
-        <p:nvPr/>
-      </p:nvGrpSpPr>
-      <p:grpSpPr>
-        <a:xfrm>
-          <a:off x="0" y="0"/>
-          <a:ext cx="0" cy="0"/>
-          <a:chOff x="0" y="0"/>
-          <a:chExt cx="0" cy="0"/>
-        </a:xfrm>
-      </p:grpSpPr>
-      <p:sp>
-        <p:nvSpPr>
-          <p:cNvPr id="2" name="Title 1">
-            <a:extLst>
-              <a:ext uri="{FF2B5EF4-FFF2-40B4-BE49-F238E27FC236}">
-                <a16:creationId xmlns:a16="http://schemas.microsoft.com/office/drawing/2014/main" id="{D7505700-4689-5F44-9538-0CB7ADD2393F}"/>
-              </a:ext>
-            </a:extLst>
-          </p:cNvPr>
-          <p:cNvSpPr>
-            <a:spLocks noGrp="1"/>
-          </p:cNvSpPr>
-          <p:nvPr>
-            <p:ph type="title"/>
-          </p:nvPr>
-        </p:nvSpPr>
-        <p:spPr/>
-        <p:txBody>
-          <a:bodyPr/>
-          <a:lstStyle/>
-          <a:p>
-            <a:r>
-              <a:rPr lang="en-US" dirty="0"/>
-              <a:t>Model</a:t>
-            </a:r>
-          </a:p>
-        </p:txBody>
-      </p:sp>
-      <p:sp>
-        <p:nvSpPr>
-          <p:cNvPr id="3" name="Content Placeholder 2">
-            <a:extLst>
-              <a:ext uri="{FF2B5EF4-FFF2-40B4-BE49-F238E27FC236}">
-                <a16:creationId xmlns:a16="http://schemas.microsoft.com/office/drawing/2014/main" id="{3FBFC376-5AC6-B646-8D3C-BDAA8EA0D2AE}"/>
-              </a:ext>
-            </a:extLst>
-          </p:cNvPr>
-          <p:cNvSpPr>
-            <a:spLocks noGrp="1"/>
-          </p:cNvSpPr>
-          <p:nvPr>
-            <p:ph idx="1"/>
-          </p:nvPr>
-        </p:nvSpPr>
-        <p:spPr/>
-        <p:txBody>
-          <a:bodyPr>
-            <a:normAutofit/>
-          </a:bodyPr>
-          <a:lstStyle/>
-          <a:p>
-            <a:pPr marL="742950" indent="-742950">
-              <a:buAutoNum type="arabicPeriod"/>
-            </a:pPr>
-            <a:r>
-              <a:rPr lang="en-US" sz="4000" dirty="0"/>
-              <a:t>Priority: interpretability</a:t>
-            </a:r>
-          </a:p>
-          <a:p>
-            <a:pPr marL="742950" indent="-742950">
-              <a:buAutoNum type="arabicPeriod"/>
-            </a:pPr>
-            <a:r>
-              <a:rPr lang="en-US" sz="4000" dirty="0"/>
-              <a:t>Reasonable predictors</a:t>
-            </a:r>
-          </a:p>
-          <a:p>
-            <a:pPr marL="742950" indent="-742950">
-              <a:buAutoNum type="arabicPeriod"/>
-            </a:pPr>
-            <a:r>
-              <a:rPr lang="en-US" sz="4000" dirty="0"/>
-              <a:t>May not result in highest r</a:t>
-            </a:r>
-            <a:r>
-              <a:rPr lang="en-US" sz="4000" baseline="30000" dirty="0"/>
-              <a:t>2</a:t>
-            </a:r>
-            <a:r>
-              <a:rPr lang="en-US" sz="4000" dirty="0"/>
-              <a:t> value</a:t>
-            </a:r>
-          </a:p>
-        </p:txBody>
-      </p:sp>
-    </p:spTree>
-    <p:extLst>
-      <p:ext uri="{BB962C8B-B14F-4D97-AF65-F5344CB8AC3E}">
-        <p14:creationId xmlns:p14="http://schemas.microsoft.com/office/powerpoint/2010/main" val="2057905881"/>
-      </p:ext>
-    </p:extLst>
-  </p:cSld>
-  <p:clrMapOvr>
-    <a:masterClrMapping/>
-  </p:clrMapOvr>
-</p:sld>
-</file>
-
-<file path=ppt/slides/slide5.xml><?xml version="1.0" encoding="utf-8"?>
-<p:sld xmlns:a="http://schemas.openxmlformats.org/drawingml/2006/main" xmlns:r="http://schemas.openxmlformats.org/officeDocument/2006/relationships" xmlns:p="http://schemas.openxmlformats.org/presentationml/2006/main">
-  <p:cSld>
-    <p:spTree>
-      <p:nvGrpSpPr>
-        <p:cNvPr id="1" name=""/>
-        <p:cNvGrpSpPr/>
-        <p:nvPr/>
-      </p:nvGrpSpPr>
-      <p:grpSpPr>
-        <a:xfrm>
-          <a:off x="0" y="0"/>
-          <a:ext cx="0" cy="0"/>
-          <a:chOff x="0" y="0"/>
-          <a:chExt cx="0" cy="0"/>
-        </a:xfrm>
-      </p:grpSpPr>
-      <p:sp>
-        <p:nvSpPr>
-          <p:cNvPr id="2" name="Title 1">
-            <a:extLst>
-              <a:ext uri="{FF2B5EF4-FFF2-40B4-BE49-F238E27FC236}">
-                <a16:creationId xmlns:a16="http://schemas.microsoft.com/office/drawing/2014/main" id="{D7505700-4689-5F44-9538-0CB7ADD2393F}"/>
-              </a:ext>
-            </a:extLst>
-          </p:cNvPr>
-          <p:cNvSpPr>
-            <a:spLocks noGrp="1"/>
-          </p:cNvSpPr>
-          <p:nvPr>
-            <p:ph type="title"/>
-          </p:nvPr>
-        </p:nvSpPr>
-        <p:spPr/>
-        <p:txBody>
-          <a:bodyPr/>
-          <a:lstStyle/>
-          <a:p>
-            <a:r>
-              <a:rPr lang="en-US" dirty="0"/>
-              <a:t>Question 1: Factors that affect house prices</a:t>
-            </a:r>
-          </a:p>
-        </p:txBody>
-      </p:sp>
-      <p:sp>
-        <p:nvSpPr>
-          <p:cNvPr id="3" name="Content Placeholder 2">
-            <a:extLst>
-              <a:ext uri="{FF2B5EF4-FFF2-40B4-BE49-F238E27FC236}">
-                <a16:creationId xmlns:a16="http://schemas.microsoft.com/office/drawing/2014/main" id="{3FBFC376-5AC6-B646-8D3C-BDAA8EA0D2AE}"/>
-              </a:ext>
-            </a:extLst>
-          </p:cNvPr>
-          <p:cNvSpPr>
-            <a:spLocks noGrp="1"/>
-          </p:cNvSpPr>
-          <p:nvPr>
-            <p:ph idx="1"/>
-          </p:nvPr>
-        </p:nvSpPr>
-        <p:spPr/>
-        <p:txBody>
-          <a:bodyPr>
-            <a:normAutofit fontScale="55000" lnSpcReduction="20000"/>
-          </a:bodyPr>
-          <a:lstStyle/>
-          <a:p>
-            <a:pPr marL="0" indent="0">
-              <a:buNone/>
-            </a:pPr>
-            <a:r>
-              <a:rPr lang="en-US" sz="4000" b="1" u="sng" dirty="0"/>
-              <a:t>Positive effectors:</a:t>
-            </a:r>
-          </a:p>
-          <a:p>
-            <a:pPr marL="0" indent="0">
-              <a:buNone/>
-            </a:pPr>
-            <a:endParaRPr lang="en-US" sz="4000" dirty="0"/>
-          </a:p>
-          <a:p>
-            <a:pPr marL="0" indent="0">
-              <a:buNone/>
-            </a:pPr>
-            <a:r>
-              <a:rPr lang="en-US" sz="4000" dirty="0"/>
-              <a:t>    1. living area = more space means higher price</a:t>
-            </a:r>
-          </a:p>
-          <a:p>
-            <a:pPr marL="0" indent="0">
-              <a:buNone/>
-            </a:pPr>
-            <a:r>
-              <a:rPr lang="en-US" sz="4000" dirty="0"/>
-              <a:t>    2. waterfront = having waterfront increases the value of the price</a:t>
-            </a:r>
-          </a:p>
-          <a:p>
-            <a:pPr marL="0" indent="0">
-              <a:buNone/>
-            </a:pPr>
-            <a:r>
-              <a:rPr lang="en-US" sz="4000" dirty="0"/>
-              <a:t>    3. grade x bathroom = having great bathrooms count!</a:t>
-            </a:r>
-          </a:p>
-          <a:p>
-            <a:pPr marL="0" indent="0">
-              <a:buNone/>
-            </a:pPr>
-            <a:r>
-              <a:rPr lang="en-US" sz="4000" dirty="0"/>
-              <a:t>    4. higher latitude = usually results in higher price</a:t>
-            </a:r>
-          </a:p>
-          <a:p>
-            <a:pPr marL="0" indent="0">
-              <a:buNone/>
-            </a:pPr>
-            <a:endParaRPr lang="en-US" sz="4000" dirty="0"/>
-          </a:p>
-          <a:p>
-            <a:pPr marL="0" indent="0">
-              <a:buNone/>
-            </a:pPr>
-            <a:r>
-              <a:rPr lang="en-US" sz="4000" b="1" u="sng" dirty="0"/>
-              <a:t>Negative effectors: </a:t>
-            </a:r>
-          </a:p>
-          <a:p>
-            <a:pPr marL="0" indent="0">
-              <a:buNone/>
-            </a:pPr>
-            <a:endParaRPr lang="en-US" sz="4000" dirty="0"/>
-          </a:p>
-          <a:p>
-            <a:pPr marL="0" indent="0">
-              <a:buNone/>
-            </a:pPr>
-            <a:r>
-              <a:rPr lang="en-US" sz="4000" dirty="0"/>
-              <a:t>    1. bath and bed= having too many of them decreases the price</a:t>
-            </a:r>
-          </a:p>
-          <a:p>
-            <a:pPr marL="0" indent="0">
-              <a:buNone/>
-            </a:pPr>
-            <a:r>
-              <a:rPr lang="en-US" sz="4000" dirty="0"/>
-              <a:t>    2.longitude = higher longitude results in lower price</a:t>
-            </a:r>
-          </a:p>
-          <a:p>
-            <a:pPr marL="0" indent="0">
-              <a:buNone/>
-            </a:pPr>
-            <a:r>
-              <a:rPr lang="en-US" sz="4000" dirty="0"/>
-              <a:t>  </a:t>
-            </a:r>
-          </a:p>
-        </p:txBody>
-      </p:sp>
-    </p:spTree>
-    <p:extLst>
-      <p:ext uri="{BB962C8B-B14F-4D97-AF65-F5344CB8AC3E}">
-        <p14:creationId xmlns:p14="http://schemas.microsoft.com/office/powerpoint/2010/main" val="3424370726"/>
-      </p:ext>
-    </p:extLst>
-  </p:cSld>
-  <p:clrMapOvr>
-    <a:masterClrMapping/>
-  </p:clrMapOvr>
-</p:sld>
-</file>
-
-<file path=ppt/slides/slide6.xml><?xml version="1.0" encoding="utf-8"?>
-<p:sld xmlns:a="http://schemas.openxmlformats.org/drawingml/2006/main" xmlns:r="http://schemas.openxmlformats.org/officeDocument/2006/relationships" xmlns:p="http://schemas.openxmlformats.org/presentationml/2006/main">
-  <p:cSld>
-    <p:spTree>
-      <p:nvGrpSpPr>
-        <p:cNvPr id="1" name=""/>
-        <p:cNvGrpSpPr/>
-        <p:nvPr/>
-      </p:nvGrpSpPr>
-      <p:grpSpPr>
-        <a:xfrm>
-          <a:off x="0" y="0"/>
-          <a:ext cx="0" cy="0"/>
-          <a:chOff x="0" y="0"/>
-          <a:chExt cx="0" cy="0"/>
-        </a:xfrm>
-      </p:grpSpPr>
+            <a:endParaRPr lang="en-US" dirty="0"/>
+          </a:p>
+        </p:txBody>
+      </p:sp>
       <p:pic>
         <p:nvPicPr>
-          <p:cNvPr id="6146" name="Picture 2">
-            <a:extLst>
-              <a:ext uri="{FF2B5EF4-FFF2-40B4-BE49-F238E27FC236}">
-                <a16:creationId xmlns:a16="http://schemas.microsoft.com/office/drawing/2014/main" id="{A5FF264C-EDFF-9048-9E45-AEFFF78EA52D}"/>
+          <p:cNvPr id="2050" name="Picture 2">
+            <a:extLst>
+              <a:ext uri="{FF2B5EF4-FFF2-40B4-BE49-F238E27FC236}">
+                <a16:creationId xmlns:a16="http://schemas.microsoft.com/office/drawing/2014/main" id="{9195E9CD-6D96-6042-9A09-F726BCF1399F}"/>
               </a:ext>
             </a:extLst>
           </p:cNvPr>
@@ -6984,8 +7014,8 @@
         </p:blipFill>
         <p:spPr bwMode="auto">
           <a:xfrm>
-            <a:off x="1260142" y="0"/>
-            <a:ext cx="9624703" cy="6870265"/>
+            <a:off x="2548919" y="365125"/>
+            <a:ext cx="6444099" cy="4700862"/>
           </a:xfrm>
           <a:prstGeom prst="rect">
             <a:avLst/>
@@ -7007,298 +7037,27 @@
           <p:cNvPr id="6" name="Content Placeholder 2">
             <a:extLst>
               <a:ext uri="{FF2B5EF4-FFF2-40B4-BE49-F238E27FC236}">
-                <a16:creationId xmlns:a16="http://schemas.microsoft.com/office/drawing/2014/main" id="{8D1291EE-F685-BF4F-8202-92A15FD926AA}"/>
-              </a:ext>
-            </a:extLst>
-          </p:cNvPr>
-          <p:cNvSpPr>
-            <a:spLocks noGrp="1"/>
-          </p:cNvSpPr>
-          <p:nvPr>
-            <p:ph idx="1"/>
-          </p:nvPr>
+                <a16:creationId xmlns:a16="http://schemas.microsoft.com/office/drawing/2014/main" id="{3C343B09-E249-D047-A82A-0BE160DC3109}"/>
+              </a:ext>
+            </a:extLst>
+          </p:cNvPr>
+          <p:cNvSpPr txBox="1">
+            <a:spLocks/>
+          </p:cNvSpPr>
+          <p:nvPr/>
         </p:nvSpPr>
         <p:spPr>
           <a:xfrm>
-            <a:off x="6096000" y="5117910"/>
-            <a:ext cx="4585648" cy="846161"/>
-          </a:xfrm>
-          <a:solidFill>
-            <a:schemeClr val="tx1"/>
-          </a:solidFill>
-        </p:spPr>
-        <p:txBody>
-          <a:bodyPr>
-            <a:normAutofit fontScale="92500"/>
-          </a:bodyPr>
-          <a:lstStyle/>
-          <a:p>
-            <a:pPr marL="0" indent="0">
-              <a:buNone/>
-            </a:pPr>
-            <a:r>
-              <a:rPr lang="en-US" dirty="0"/>
-              <a:t>Strong positive association between living space and price</a:t>
-            </a:r>
-          </a:p>
-        </p:txBody>
-      </p:sp>
-    </p:spTree>
-    <p:extLst>
-      <p:ext uri="{BB962C8B-B14F-4D97-AF65-F5344CB8AC3E}">
-        <p14:creationId xmlns:p14="http://schemas.microsoft.com/office/powerpoint/2010/main" val="1408480789"/>
-      </p:ext>
-    </p:extLst>
-  </p:cSld>
-  <p:clrMapOvr>
-    <a:masterClrMapping/>
-  </p:clrMapOvr>
-</p:sld>
-</file>
-
-<file path=ppt/slides/slide7.xml><?xml version="1.0" encoding="utf-8"?>
-<p:sld xmlns:a="http://schemas.openxmlformats.org/drawingml/2006/main" xmlns:r="http://schemas.openxmlformats.org/officeDocument/2006/relationships" xmlns:p="http://schemas.openxmlformats.org/presentationml/2006/main">
-  <p:cSld>
-    <p:spTree>
-      <p:nvGrpSpPr>
-        <p:cNvPr id="1" name=""/>
-        <p:cNvGrpSpPr/>
-        <p:nvPr/>
-      </p:nvGrpSpPr>
-      <p:grpSpPr>
-        <a:xfrm>
-          <a:off x="0" y="0"/>
-          <a:ext cx="0" cy="0"/>
-          <a:chOff x="0" y="0"/>
-          <a:chExt cx="0" cy="0"/>
-        </a:xfrm>
-      </p:grpSpPr>
-      <p:pic>
-        <p:nvPicPr>
-          <p:cNvPr id="7170" name="Picture 2">
-            <a:extLst>
-              <a:ext uri="{FF2B5EF4-FFF2-40B4-BE49-F238E27FC236}">
-                <a16:creationId xmlns:a16="http://schemas.microsoft.com/office/drawing/2014/main" id="{3751145F-7BE7-5E4E-BC77-3E20B79C924B}"/>
-              </a:ext>
-            </a:extLst>
-          </p:cNvPr>
-          <p:cNvPicPr>
-            <a:picLocks noChangeAspect="1" noChangeArrowheads="1"/>
-          </p:cNvPicPr>
-          <p:nvPr/>
-        </p:nvPicPr>
-        <p:blipFill>
-          <a:blip r:embed="rId2">
-            <a:extLst>
-              <a:ext uri="{28A0092B-C50C-407E-A947-70E740481C1C}">
-                <a14:useLocalDpi xmlns:a14="http://schemas.microsoft.com/office/drawing/2010/main" val="0"/>
-              </a:ext>
-            </a:extLst>
-          </a:blip>
-          <a:srcRect/>
-          <a:stretch>
-            <a:fillRect/>
-          </a:stretch>
-        </p:blipFill>
-        <p:spPr bwMode="auto">
-          <a:xfrm>
-            <a:off x="1225265" y="0"/>
-            <a:ext cx="9597409" cy="6850782"/>
+            <a:off x="3936913" y="5312980"/>
+            <a:ext cx="3668110" cy="1282262"/>
           </a:xfrm>
           <a:prstGeom prst="rect">
             <a:avLst/>
           </a:prstGeom>
-          <a:noFill/>
-          <a:extLst>
-            <a:ext uri="{909E8E84-426E-40DD-AFC4-6F175D3DCCD1}">
-              <a14:hiddenFill xmlns:a14="http://schemas.microsoft.com/office/drawing/2010/main">
-                <a:solidFill>
-                  <a:srgbClr val="FFFFFF"/>
-                </a:solidFill>
-              </a14:hiddenFill>
-            </a:ext>
-          </a:extLst>
         </p:spPr>
-      </p:pic>
-      <p:sp>
-        <p:nvSpPr>
-          <p:cNvPr id="4" name="TextBox 3">
-            <a:extLst>
-              <a:ext uri="{FF2B5EF4-FFF2-40B4-BE49-F238E27FC236}">
-                <a16:creationId xmlns:a16="http://schemas.microsoft.com/office/drawing/2014/main" id="{824F23AB-DA15-2344-B10B-D1308C0A67FA}"/>
-              </a:ext>
-            </a:extLst>
-          </p:cNvPr>
-          <p:cNvSpPr txBox="1"/>
-          <p:nvPr/>
-        </p:nvSpPr>
-        <p:spPr>
-          <a:xfrm>
-            <a:off x="8284191" y="4217158"/>
-            <a:ext cx="184731" cy="369332"/>
-          </a:xfrm>
-          <a:prstGeom prst="rect">
-            <a:avLst/>
-          </a:prstGeom>
-          <a:noFill/>
-        </p:spPr>
-        <p:txBody>
-          <a:bodyPr wrap="none" rtlCol="0">
-            <a:spAutoFit/>
-          </a:bodyPr>
-          <a:lstStyle/>
-          <a:p>
-            <a:endParaRPr lang="en-US" dirty="0"/>
-          </a:p>
-        </p:txBody>
-      </p:sp>
-      <p:sp>
-        <p:nvSpPr>
-          <p:cNvPr id="6" name="Content Placeholder 2">
-            <a:extLst>
-              <a:ext uri="{FF2B5EF4-FFF2-40B4-BE49-F238E27FC236}">
-                <a16:creationId xmlns:a16="http://schemas.microsoft.com/office/drawing/2014/main" id="{8D1291EE-F685-BF4F-8202-92A15FD926AA}"/>
-              </a:ext>
-            </a:extLst>
-          </p:cNvPr>
-          <p:cNvSpPr>
-            <a:spLocks noGrp="1"/>
-          </p:cNvSpPr>
-          <p:nvPr>
-            <p:ph idx="1"/>
-          </p:nvPr>
-        </p:nvSpPr>
-        <p:spPr>
-          <a:xfrm>
-            <a:off x="5418161" y="5363794"/>
-            <a:ext cx="5222544" cy="709684"/>
-          </a:xfrm>
-          <a:solidFill>
-            <a:schemeClr val="tx1"/>
-          </a:solidFill>
-        </p:spPr>
-        <p:txBody>
-          <a:bodyPr>
-            <a:normAutofit fontScale="85000" lnSpcReduction="10000"/>
-          </a:bodyPr>
-          <a:lstStyle/>
-          <a:p>
-            <a:pPr marL="0" indent="0">
-              <a:buNone/>
-            </a:pPr>
-            <a:r>
-              <a:rPr lang="en-US" dirty="0"/>
-              <a:t>Strong positive association between presence of waterfront and price</a:t>
-            </a:r>
-          </a:p>
-        </p:txBody>
-      </p:sp>
-    </p:spTree>
-    <p:extLst>
-      <p:ext uri="{BB962C8B-B14F-4D97-AF65-F5344CB8AC3E}">
-        <p14:creationId xmlns:p14="http://schemas.microsoft.com/office/powerpoint/2010/main" val="1086511096"/>
-      </p:ext>
-    </p:extLst>
-  </p:cSld>
-  <p:clrMapOvr>
-    <a:masterClrMapping/>
-  </p:clrMapOvr>
-</p:sld>
-</file>
-
-<file path=ppt/slides/slide8.xml><?xml version="1.0" encoding="utf-8"?>
-<p:sld xmlns:a="http://schemas.openxmlformats.org/drawingml/2006/main" xmlns:r="http://schemas.openxmlformats.org/officeDocument/2006/relationships" xmlns:p="http://schemas.openxmlformats.org/presentationml/2006/main">
-  <p:cSld>
-    <p:spTree>
-      <p:nvGrpSpPr>
-        <p:cNvPr id="1" name=""/>
-        <p:cNvGrpSpPr/>
-        <p:nvPr/>
-      </p:nvGrpSpPr>
-      <p:grpSpPr>
-        <a:xfrm>
-          <a:off x="0" y="0"/>
-          <a:ext cx="0" cy="0"/>
-          <a:chOff x="0" y="0"/>
-          <a:chExt cx="0" cy="0"/>
-        </a:xfrm>
-      </p:grpSpPr>
-      <p:pic>
-        <p:nvPicPr>
-          <p:cNvPr id="9220" name="Picture 4">
-            <a:extLst>
-              <a:ext uri="{FF2B5EF4-FFF2-40B4-BE49-F238E27FC236}">
-                <a16:creationId xmlns:a16="http://schemas.microsoft.com/office/drawing/2014/main" id="{801D099B-D8BB-7E44-B315-F6BB39D840B3}"/>
-              </a:ext>
-            </a:extLst>
-          </p:cNvPr>
-          <p:cNvPicPr>
-            <a:picLocks noChangeAspect="1" noChangeArrowheads="1"/>
-          </p:cNvPicPr>
-          <p:nvPr/>
-        </p:nvPicPr>
-        <p:blipFill>
-          <a:blip r:embed="rId2">
-            <a:extLst>
-              <a:ext uri="{28A0092B-C50C-407E-A947-70E740481C1C}">
-                <a14:useLocalDpi xmlns:a14="http://schemas.microsoft.com/office/drawing/2010/main" val="0"/>
-              </a:ext>
-            </a:extLst>
-          </a:blip>
-          <a:srcRect/>
-          <a:stretch>
-            <a:fillRect/>
-          </a:stretch>
-        </p:blipFill>
-        <p:spPr bwMode="auto">
-          <a:xfrm>
-            <a:off x="1170674" y="0"/>
-            <a:ext cx="9597409" cy="6850782"/>
-          </a:xfrm>
-          <a:prstGeom prst="rect">
-            <a:avLst/>
-          </a:prstGeom>
-          <a:noFill/>
-          <a:extLst>
-            <a:ext uri="{909E8E84-426E-40DD-AFC4-6F175D3DCCD1}">
-              <a14:hiddenFill xmlns:a14="http://schemas.microsoft.com/office/drawing/2010/main">
-                <a:solidFill>
-                  <a:srgbClr val="FFFFFF"/>
-                </a:solidFill>
-              </a14:hiddenFill>
-            </a:ext>
-          </a:extLst>
-        </p:spPr>
-      </p:pic>
-      <p:sp>
-        <p:nvSpPr>
-          <p:cNvPr id="5" name="Content Placeholder 2">
-            <a:extLst>
-              <a:ext uri="{FF2B5EF4-FFF2-40B4-BE49-F238E27FC236}">
-                <a16:creationId xmlns:a16="http://schemas.microsoft.com/office/drawing/2014/main" id="{2C9B9C45-133F-8644-92B3-108B8504C0C3}"/>
-              </a:ext>
-            </a:extLst>
-          </p:cNvPr>
-          <p:cNvSpPr txBox="1">
-            <a:spLocks/>
-          </p:cNvSpPr>
-          <p:nvPr/>
-        </p:nvSpPr>
-        <p:spPr>
-          <a:xfrm>
-            <a:off x="5418161" y="4763069"/>
-            <a:ext cx="5222544" cy="1283113"/>
-          </a:xfrm>
-          <a:prstGeom prst="rect">
-            <a:avLst/>
-          </a:prstGeom>
-          <a:solidFill>
-            <a:schemeClr val="tx1"/>
-          </a:solidFill>
-        </p:spPr>
         <p:txBody>
           <a:bodyPr vert="horz" lIns="91440" tIns="45720" rIns="91440" bIns="45720" rtlCol="0">
-            <a:normAutofit/>
+            <a:normAutofit fontScale="92500" lnSpcReduction="20000"/>
           </a:bodyPr>
           <a:lstStyle>
             <a:lvl1pPr marL="228600" indent="-228600" algn="l" defTabSz="914400" rtl="0" eaLnBrk="1" latinLnBrk="0" hangingPunct="1">
@@ -7480,8 +7239,261 @@
               <a:buNone/>
             </a:pPr>
             <a:r>
+              <a:rPr lang="en-US" u="sng" dirty="0"/>
+              <a:t>Higher Prices</a:t>
+            </a:r>
+          </a:p>
+          <a:p>
+            <a:pPr>
+              <a:buFontTx/>
+              <a:buChar char="-"/>
+            </a:pPr>
+            <a:r>
               <a:rPr lang="en-US" dirty="0"/>
-              <a:t>Strong positive association between presence of living area-bedroom ratio and price</a:t>
+              <a:t>Usually clustered</a:t>
+            </a:r>
+          </a:p>
+          <a:p>
+            <a:pPr>
+              <a:buFontTx/>
+              <a:buChar char="-"/>
+            </a:pPr>
+            <a:r>
+              <a:rPr lang="en-US" dirty="0"/>
+              <a:t>Near water area</a:t>
+            </a:r>
+          </a:p>
+        </p:txBody>
+      </p:sp>
+      <p:sp>
+        <p:nvSpPr>
+          <p:cNvPr id="9" name="Content Placeholder 2">
+            <a:extLst>
+              <a:ext uri="{FF2B5EF4-FFF2-40B4-BE49-F238E27FC236}">
+                <a16:creationId xmlns:a16="http://schemas.microsoft.com/office/drawing/2014/main" id="{6F72E3D9-B17C-E54F-A0FB-6F421B459274}"/>
+              </a:ext>
+            </a:extLst>
+          </p:cNvPr>
+          <p:cNvSpPr txBox="1">
+            <a:spLocks/>
+          </p:cNvSpPr>
+          <p:nvPr/>
+        </p:nvSpPr>
+        <p:spPr>
+          <a:xfrm>
+            <a:off x="7158962" y="5312980"/>
+            <a:ext cx="5033038" cy="1282262"/>
+          </a:xfrm>
+          <a:prstGeom prst="rect">
+            <a:avLst/>
+          </a:prstGeom>
+        </p:spPr>
+        <p:txBody>
+          <a:bodyPr vert="horz" lIns="91440" tIns="45720" rIns="91440" bIns="45720" rtlCol="0">
+            <a:normAutofit fontScale="92500" lnSpcReduction="20000"/>
+          </a:bodyPr>
+          <a:lstStyle>
+            <a:lvl1pPr marL="228600" indent="-228600" algn="l" defTabSz="914400" rtl="0" eaLnBrk="1" latinLnBrk="0" hangingPunct="1">
+              <a:lnSpc>
+                <a:spcPct val="90000"/>
+              </a:lnSpc>
+              <a:spcBef>
+                <a:spcPts val="1000"/>
+              </a:spcBef>
+              <a:buFont typeface="Arial" panose="020B0604020202020204" pitchFamily="34" charset="0"/>
+              <a:buChar char="•"/>
+              <a:defRPr sz="2800" b="0" i="0" kern="1200">
+                <a:solidFill>
+                  <a:schemeClr val="bg1">
+                    <a:lumMod val="95000"/>
+                  </a:schemeClr>
+                </a:solidFill>
+                <a:latin typeface="Gotham Narrow Book" pitchFamily="2" charset="0"/>
+                <a:ea typeface="+mn-ea"/>
+                <a:cs typeface="+mn-cs"/>
+              </a:defRPr>
+            </a:lvl1pPr>
+            <a:lvl2pPr marL="685800" indent="-228600" algn="l" defTabSz="914400" rtl="0" eaLnBrk="1" latinLnBrk="0" hangingPunct="1">
+              <a:lnSpc>
+                <a:spcPct val="90000"/>
+              </a:lnSpc>
+              <a:spcBef>
+                <a:spcPts val="500"/>
+              </a:spcBef>
+              <a:buFont typeface="Arial" panose="020B0604020202020204" pitchFamily="34" charset="0"/>
+              <a:buChar char="•"/>
+              <a:defRPr sz="2400" b="0" i="0" kern="1200">
+                <a:solidFill>
+                  <a:schemeClr val="bg1">
+                    <a:lumMod val="95000"/>
+                  </a:schemeClr>
+                </a:solidFill>
+                <a:latin typeface="Gotham Narrow Book" pitchFamily="2" charset="0"/>
+                <a:ea typeface="+mn-ea"/>
+                <a:cs typeface="+mn-cs"/>
+              </a:defRPr>
+            </a:lvl2pPr>
+            <a:lvl3pPr marL="1143000" indent="-228600" algn="l" defTabSz="914400" rtl="0" eaLnBrk="1" latinLnBrk="0" hangingPunct="1">
+              <a:lnSpc>
+                <a:spcPct val="90000"/>
+              </a:lnSpc>
+              <a:spcBef>
+                <a:spcPts val="500"/>
+              </a:spcBef>
+              <a:buFont typeface="Arial" panose="020B0604020202020204" pitchFamily="34" charset="0"/>
+              <a:buChar char="•"/>
+              <a:defRPr sz="2000" b="0" i="0" kern="1200">
+                <a:solidFill>
+                  <a:schemeClr val="bg1">
+                    <a:lumMod val="95000"/>
+                  </a:schemeClr>
+                </a:solidFill>
+                <a:latin typeface="Gotham Narrow Book" pitchFamily="2" charset="0"/>
+                <a:ea typeface="+mn-ea"/>
+                <a:cs typeface="+mn-cs"/>
+              </a:defRPr>
+            </a:lvl3pPr>
+            <a:lvl4pPr marL="1600200" indent="-228600" algn="l" defTabSz="914400" rtl="0" eaLnBrk="1" latinLnBrk="0" hangingPunct="1">
+              <a:lnSpc>
+                <a:spcPct val="90000"/>
+              </a:lnSpc>
+              <a:spcBef>
+                <a:spcPts val="500"/>
+              </a:spcBef>
+              <a:buFont typeface="Arial" panose="020B0604020202020204" pitchFamily="34" charset="0"/>
+              <a:buChar char="•"/>
+              <a:defRPr sz="1800" b="0" i="0" kern="1200">
+                <a:solidFill>
+                  <a:schemeClr val="bg1">
+                    <a:lumMod val="95000"/>
+                  </a:schemeClr>
+                </a:solidFill>
+                <a:latin typeface="Gotham Narrow Book" pitchFamily="2" charset="0"/>
+                <a:ea typeface="+mn-ea"/>
+                <a:cs typeface="+mn-cs"/>
+              </a:defRPr>
+            </a:lvl4pPr>
+            <a:lvl5pPr marL="2057400" indent="-228600" algn="l" defTabSz="914400" rtl="0" eaLnBrk="1" latinLnBrk="0" hangingPunct="1">
+              <a:lnSpc>
+                <a:spcPct val="90000"/>
+              </a:lnSpc>
+              <a:spcBef>
+                <a:spcPts val="500"/>
+              </a:spcBef>
+              <a:buFont typeface="Arial" panose="020B0604020202020204" pitchFamily="34" charset="0"/>
+              <a:buChar char="•"/>
+              <a:defRPr sz="1800" b="0" i="0" kern="1200">
+                <a:solidFill>
+                  <a:schemeClr val="bg1">
+                    <a:lumMod val="95000"/>
+                  </a:schemeClr>
+                </a:solidFill>
+                <a:latin typeface="Gotham Narrow Book" pitchFamily="2" charset="0"/>
+                <a:ea typeface="+mn-ea"/>
+                <a:cs typeface="+mn-cs"/>
+              </a:defRPr>
+            </a:lvl5pPr>
+            <a:lvl6pPr marL="2514600" indent="-228600" algn="l" defTabSz="914400" rtl="0" eaLnBrk="1" latinLnBrk="0" hangingPunct="1">
+              <a:lnSpc>
+                <a:spcPct val="90000"/>
+              </a:lnSpc>
+              <a:spcBef>
+                <a:spcPts val="500"/>
+              </a:spcBef>
+              <a:buFont typeface="Arial" panose="020B0604020202020204" pitchFamily="34" charset="0"/>
+              <a:buChar char="•"/>
+              <a:defRPr sz="1800" kern="1200">
+                <a:solidFill>
+                  <a:schemeClr val="tx1"/>
+                </a:solidFill>
+                <a:latin typeface="+mn-lt"/>
+                <a:ea typeface="+mn-ea"/>
+                <a:cs typeface="+mn-cs"/>
+              </a:defRPr>
+            </a:lvl6pPr>
+            <a:lvl7pPr marL="2971800" indent="-228600" algn="l" defTabSz="914400" rtl="0" eaLnBrk="1" latinLnBrk="0" hangingPunct="1">
+              <a:lnSpc>
+                <a:spcPct val="90000"/>
+              </a:lnSpc>
+              <a:spcBef>
+                <a:spcPts val="500"/>
+              </a:spcBef>
+              <a:buFont typeface="Arial" panose="020B0604020202020204" pitchFamily="34" charset="0"/>
+              <a:buChar char="•"/>
+              <a:defRPr sz="1800" kern="1200">
+                <a:solidFill>
+                  <a:schemeClr val="tx1"/>
+                </a:solidFill>
+                <a:latin typeface="+mn-lt"/>
+                <a:ea typeface="+mn-ea"/>
+                <a:cs typeface="+mn-cs"/>
+              </a:defRPr>
+            </a:lvl7pPr>
+            <a:lvl8pPr marL="3429000" indent="-228600" algn="l" defTabSz="914400" rtl="0" eaLnBrk="1" latinLnBrk="0" hangingPunct="1">
+              <a:lnSpc>
+                <a:spcPct val="90000"/>
+              </a:lnSpc>
+              <a:spcBef>
+                <a:spcPts val="500"/>
+              </a:spcBef>
+              <a:buFont typeface="Arial" panose="020B0604020202020204" pitchFamily="34" charset="0"/>
+              <a:buChar char="•"/>
+              <a:defRPr sz="1800" kern="1200">
+                <a:solidFill>
+                  <a:schemeClr val="tx1"/>
+                </a:solidFill>
+                <a:latin typeface="+mn-lt"/>
+                <a:ea typeface="+mn-ea"/>
+                <a:cs typeface="+mn-cs"/>
+              </a:defRPr>
+            </a:lvl8pPr>
+            <a:lvl9pPr marL="3886200" indent="-228600" algn="l" defTabSz="914400" rtl="0" eaLnBrk="1" latinLnBrk="0" hangingPunct="1">
+              <a:lnSpc>
+                <a:spcPct val="90000"/>
+              </a:lnSpc>
+              <a:spcBef>
+                <a:spcPts val="500"/>
+              </a:spcBef>
+              <a:buFont typeface="Arial" panose="020B0604020202020204" pitchFamily="34" charset="0"/>
+              <a:buChar char="•"/>
+              <a:defRPr sz="1800" kern="1200">
+                <a:solidFill>
+                  <a:schemeClr val="tx1"/>
+                </a:solidFill>
+                <a:latin typeface="+mn-lt"/>
+                <a:ea typeface="+mn-ea"/>
+                <a:cs typeface="+mn-cs"/>
+              </a:defRPr>
+            </a:lvl9pPr>
+          </a:lstStyle>
+          <a:p>
+            <a:pPr marL="0" indent="0">
+              <a:buFont typeface="Arial" panose="020B0604020202020204" pitchFamily="34" charset="0"/>
+              <a:buNone/>
+            </a:pPr>
+            <a:r>
+              <a:rPr lang="en-US" u="sng" dirty="0"/>
+              <a:t>Lower Prices</a:t>
+            </a:r>
+          </a:p>
+          <a:p>
+            <a:pPr>
+              <a:buFontTx/>
+              <a:buChar char="-"/>
+            </a:pPr>
+            <a:r>
+              <a:rPr lang="en-US" dirty="0"/>
+              <a:t>Spread out</a:t>
+            </a:r>
+          </a:p>
+          <a:p>
+            <a:pPr>
+              <a:buFontTx/>
+              <a:buChar char="-"/>
+            </a:pPr>
+            <a:r>
+              <a:rPr lang="en-US" dirty="0"/>
+              <a:t>Away from the main city</a:t>
             </a:r>
           </a:p>
         </p:txBody>
@@ -7489,7 +7501,1566 @@
     </p:spTree>
     <p:extLst>
       <p:ext uri="{BB962C8B-B14F-4D97-AF65-F5344CB8AC3E}">
-        <p14:creationId xmlns:p14="http://schemas.microsoft.com/office/powerpoint/2010/main" val="2355087514"/>
+        <p14:creationId xmlns:p14="http://schemas.microsoft.com/office/powerpoint/2010/main" val="1709715260"/>
+      </p:ext>
+    </p:extLst>
+  </p:cSld>
+  <p:clrMapOvr>
+    <a:masterClrMapping/>
+  </p:clrMapOvr>
+</p:sld>
+</file>
+
+<file path=ppt/slides/slide4.xml><?xml version="1.0" encoding="utf-8"?>
+<p:sld xmlns:a="http://schemas.openxmlformats.org/drawingml/2006/main" xmlns:r="http://schemas.openxmlformats.org/officeDocument/2006/relationships" xmlns:p="http://schemas.openxmlformats.org/presentationml/2006/main">
+  <p:cSld>
+    <p:spTree>
+      <p:nvGrpSpPr>
+        <p:cNvPr id="1" name=""/>
+        <p:cNvGrpSpPr/>
+        <p:nvPr/>
+      </p:nvGrpSpPr>
+      <p:grpSpPr>
+        <a:xfrm>
+          <a:off x="0" y="0"/>
+          <a:ext cx="0" cy="0"/>
+          <a:chOff x="0" y="0"/>
+          <a:chExt cx="0" cy="0"/>
+        </a:xfrm>
+      </p:grpSpPr>
+      <p:sp>
+        <p:nvSpPr>
+          <p:cNvPr id="2" name="Title 1">
+            <a:extLst>
+              <a:ext uri="{FF2B5EF4-FFF2-40B4-BE49-F238E27FC236}">
+                <a16:creationId xmlns:a16="http://schemas.microsoft.com/office/drawing/2014/main" id="{D7505700-4689-5F44-9538-0CB7ADD2393F}"/>
+              </a:ext>
+            </a:extLst>
+          </p:cNvPr>
+          <p:cNvSpPr>
+            <a:spLocks noGrp="1"/>
+          </p:cNvSpPr>
+          <p:nvPr>
+            <p:ph type="title"/>
+          </p:nvPr>
+        </p:nvSpPr>
+        <p:spPr/>
+        <p:txBody>
+          <a:bodyPr/>
+          <a:lstStyle/>
+          <a:p>
+            <a:r>
+              <a:rPr lang="en-US" b="1" dirty="0"/>
+              <a:t>Question 1</a:t>
+            </a:r>
+          </a:p>
+        </p:txBody>
+      </p:sp>
+      <p:sp>
+        <p:nvSpPr>
+          <p:cNvPr id="3" name="Content Placeholder 2">
+            <a:extLst>
+              <a:ext uri="{FF2B5EF4-FFF2-40B4-BE49-F238E27FC236}">
+                <a16:creationId xmlns:a16="http://schemas.microsoft.com/office/drawing/2014/main" id="{3FBFC376-5AC6-B646-8D3C-BDAA8EA0D2AE}"/>
+              </a:ext>
+            </a:extLst>
+          </p:cNvPr>
+          <p:cNvSpPr>
+            <a:spLocks noGrp="1"/>
+          </p:cNvSpPr>
+          <p:nvPr>
+            <p:ph idx="1"/>
+          </p:nvPr>
+        </p:nvSpPr>
+        <p:spPr/>
+        <p:txBody>
+          <a:bodyPr>
+            <a:normAutofit/>
+          </a:bodyPr>
+          <a:lstStyle/>
+          <a:p>
+            <a:pPr marL="0" indent="0">
+              <a:buNone/>
+            </a:pPr>
+            <a:r>
+              <a:rPr lang="en-US" sz="4000" dirty="0"/>
+              <a:t>What factors affect the house prices the most in most interpretable and reasonable way?</a:t>
+            </a:r>
+          </a:p>
+        </p:txBody>
+      </p:sp>
+    </p:spTree>
+    <p:extLst>
+      <p:ext uri="{BB962C8B-B14F-4D97-AF65-F5344CB8AC3E}">
+        <p14:creationId xmlns:p14="http://schemas.microsoft.com/office/powerpoint/2010/main" val="4109023319"/>
+      </p:ext>
+    </p:extLst>
+  </p:cSld>
+  <p:clrMapOvr>
+    <a:masterClrMapping/>
+  </p:clrMapOvr>
+</p:sld>
+</file>
+
+<file path=ppt/slides/slide5.xml><?xml version="1.0" encoding="utf-8"?>
+<p:sld xmlns:a="http://schemas.openxmlformats.org/drawingml/2006/main" xmlns:r="http://schemas.openxmlformats.org/officeDocument/2006/relationships" xmlns:p="http://schemas.openxmlformats.org/presentationml/2006/main">
+  <p:cSld>
+    <p:spTree>
+      <p:nvGrpSpPr>
+        <p:cNvPr id="1" name=""/>
+        <p:cNvGrpSpPr/>
+        <p:nvPr/>
+      </p:nvGrpSpPr>
+      <p:grpSpPr>
+        <a:xfrm>
+          <a:off x="0" y="0"/>
+          <a:ext cx="0" cy="0"/>
+          <a:chOff x="0" y="0"/>
+          <a:chExt cx="0" cy="0"/>
+        </a:xfrm>
+      </p:grpSpPr>
+      <p:sp>
+        <p:nvSpPr>
+          <p:cNvPr id="2" name="Title 1">
+            <a:extLst>
+              <a:ext uri="{FF2B5EF4-FFF2-40B4-BE49-F238E27FC236}">
+                <a16:creationId xmlns:a16="http://schemas.microsoft.com/office/drawing/2014/main" id="{D7505700-4689-5F44-9538-0CB7ADD2393F}"/>
+              </a:ext>
+            </a:extLst>
+          </p:cNvPr>
+          <p:cNvSpPr>
+            <a:spLocks noGrp="1"/>
+          </p:cNvSpPr>
+          <p:nvPr>
+            <p:ph type="title"/>
+          </p:nvPr>
+        </p:nvSpPr>
+        <p:spPr/>
+        <p:txBody>
+          <a:bodyPr/>
+          <a:lstStyle/>
+          <a:p>
+            <a:r>
+              <a:rPr lang="en-US" dirty="0"/>
+              <a:t>Model Goals</a:t>
+            </a:r>
+          </a:p>
+        </p:txBody>
+      </p:sp>
+      <p:sp>
+        <p:nvSpPr>
+          <p:cNvPr id="3" name="Content Placeholder 2">
+            <a:extLst>
+              <a:ext uri="{FF2B5EF4-FFF2-40B4-BE49-F238E27FC236}">
+                <a16:creationId xmlns:a16="http://schemas.microsoft.com/office/drawing/2014/main" id="{3FBFC376-5AC6-B646-8D3C-BDAA8EA0D2AE}"/>
+              </a:ext>
+            </a:extLst>
+          </p:cNvPr>
+          <p:cNvSpPr>
+            <a:spLocks noGrp="1"/>
+          </p:cNvSpPr>
+          <p:nvPr>
+            <p:ph idx="1"/>
+          </p:nvPr>
+        </p:nvSpPr>
+        <p:spPr/>
+        <p:txBody>
+          <a:bodyPr>
+            <a:normAutofit/>
+          </a:bodyPr>
+          <a:lstStyle/>
+          <a:p>
+            <a:pPr marL="742950" indent="-742950">
+              <a:buAutoNum type="arabicPeriod"/>
+            </a:pPr>
+            <a:r>
+              <a:rPr lang="en-US" sz="4000" dirty="0"/>
+              <a:t>Prioritize interpretability</a:t>
+            </a:r>
+          </a:p>
+          <a:p>
+            <a:pPr marL="742950" indent="-742950">
+              <a:buAutoNum type="arabicPeriod"/>
+            </a:pPr>
+            <a:r>
+              <a:rPr lang="en-US" sz="4000" dirty="0"/>
+              <a:t>Have reasonable predictors that can be altered by the owners</a:t>
+            </a:r>
+          </a:p>
+          <a:p>
+            <a:pPr marL="742950" indent="-742950">
+              <a:buAutoNum type="arabicPeriod"/>
+            </a:pPr>
+            <a:r>
+              <a:rPr lang="en-US" sz="4000" dirty="0"/>
+              <a:t>May not result in highest r</a:t>
+            </a:r>
+            <a:r>
+              <a:rPr lang="en-US" sz="4000" baseline="30000" dirty="0"/>
+              <a:t>2</a:t>
+            </a:r>
+            <a:r>
+              <a:rPr lang="en-US" sz="4000" dirty="0"/>
+              <a:t> value</a:t>
+            </a:r>
+          </a:p>
+        </p:txBody>
+      </p:sp>
+    </p:spTree>
+    <p:extLst>
+      <p:ext uri="{BB962C8B-B14F-4D97-AF65-F5344CB8AC3E}">
+        <p14:creationId xmlns:p14="http://schemas.microsoft.com/office/powerpoint/2010/main" val="2057905881"/>
+      </p:ext>
+    </p:extLst>
+  </p:cSld>
+  <p:clrMapOvr>
+    <a:masterClrMapping/>
+  </p:clrMapOvr>
+</p:sld>
+</file>
+
+<file path=ppt/slides/slide6.xml><?xml version="1.0" encoding="utf-8"?>
+<p:sld xmlns:a="http://schemas.openxmlformats.org/drawingml/2006/main" xmlns:r="http://schemas.openxmlformats.org/officeDocument/2006/relationships" xmlns:p="http://schemas.openxmlformats.org/presentationml/2006/main">
+  <p:cSld>
+    <p:spTree>
+      <p:nvGrpSpPr>
+        <p:cNvPr id="1" name=""/>
+        <p:cNvGrpSpPr/>
+        <p:nvPr/>
+      </p:nvGrpSpPr>
+      <p:grpSpPr>
+        <a:xfrm>
+          <a:off x="0" y="0"/>
+          <a:ext cx="0" cy="0"/>
+          <a:chOff x="0" y="0"/>
+          <a:chExt cx="0" cy="0"/>
+        </a:xfrm>
+      </p:grpSpPr>
+      <p:sp>
+        <p:nvSpPr>
+          <p:cNvPr id="2" name="Title 1">
+            <a:extLst>
+              <a:ext uri="{FF2B5EF4-FFF2-40B4-BE49-F238E27FC236}">
+                <a16:creationId xmlns:a16="http://schemas.microsoft.com/office/drawing/2014/main" id="{D7505700-4689-5F44-9538-0CB7ADD2393F}"/>
+              </a:ext>
+            </a:extLst>
+          </p:cNvPr>
+          <p:cNvSpPr>
+            <a:spLocks noGrp="1"/>
+          </p:cNvSpPr>
+          <p:nvPr>
+            <p:ph type="title"/>
+          </p:nvPr>
+        </p:nvSpPr>
+        <p:spPr/>
+        <p:txBody>
+          <a:bodyPr/>
+          <a:lstStyle/>
+          <a:p>
+            <a:r>
+              <a:rPr lang="en-US" dirty="0"/>
+              <a:t>Model Result – Positive Effectors</a:t>
+            </a:r>
+          </a:p>
+        </p:txBody>
+      </p:sp>
+      <p:sp>
+        <p:nvSpPr>
+          <p:cNvPr id="3" name="Content Placeholder 2">
+            <a:extLst>
+              <a:ext uri="{FF2B5EF4-FFF2-40B4-BE49-F238E27FC236}">
+                <a16:creationId xmlns:a16="http://schemas.microsoft.com/office/drawing/2014/main" id="{3FBFC376-5AC6-B646-8D3C-BDAA8EA0D2AE}"/>
+              </a:ext>
+            </a:extLst>
+          </p:cNvPr>
+          <p:cNvSpPr>
+            <a:spLocks noGrp="1"/>
+          </p:cNvSpPr>
+          <p:nvPr>
+            <p:ph idx="1"/>
+          </p:nvPr>
+        </p:nvSpPr>
+        <p:spPr>
+          <a:xfrm>
+            <a:off x="838200" y="1825625"/>
+            <a:ext cx="5709745" cy="4351338"/>
+          </a:xfrm>
+        </p:spPr>
+        <p:txBody>
+          <a:bodyPr>
+            <a:normAutofit/>
+          </a:bodyPr>
+          <a:lstStyle/>
+          <a:p>
+            <a:pPr marL="0" indent="0">
+              <a:buNone/>
+            </a:pPr>
+            <a:r>
+              <a:rPr lang="en-US" sz="1800" b="1" u="sng" dirty="0"/>
+              <a:t>Major Positive Effectors:</a:t>
+            </a:r>
+            <a:endParaRPr lang="en-US" sz="1800" dirty="0"/>
+          </a:p>
+          <a:p>
+            <a:pPr marL="0" indent="0">
+              <a:buNone/>
+            </a:pPr>
+            <a:r>
+              <a:rPr lang="en-US" sz="1800" dirty="0"/>
+              <a:t>    1. waterfront = water scenery matters</a:t>
+            </a:r>
+          </a:p>
+          <a:p>
+            <a:pPr marL="0" indent="0">
+              <a:buNone/>
+            </a:pPr>
+            <a:r>
+              <a:rPr lang="en-US" sz="1800" dirty="0"/>
+              <a:t>    2. average room space = more space is better</a:t>
+            </a:r>
+          </a:p>
+          <a:p>
+            <a:pPr marL="0" indent="0">
+              <a:buNone/>
+            </a:pPr>
+            <a:r>
+              <a:rPr lang="en-US" sz="1800" dirty="0"/>
+              <a:t>    3. grade x bathroom = having great bathrooms count!</a:t>
+            </a:r>
+          </a:p>
+          <a:p>
+            <a:pPr marL="0" indent="0">
+              <a:buNone/>
+            </a:pPr>
+            <a:r>
+              <a:rPr lang="en-US" sz="1800" dirty="0"/>
+              <a:t>    4. Seattle = Further you live from Seattle is better</a:t>
+            </a:r>
+          </a:p>
+          <a:p>
+            <a:pPr marL="0" indent="0">
+              <a:buNone/>
+            </a:pPr>
+            <a:endParaRPr lang="en-US" sz="1800" dirty="0"/>
+          </a:p>
+          <a:p>
+            <a:pPr marL="0" indent="0">
+              <a:buNone/>
+            </a:pPr>
+            <a:r>
+              <a:rPr lang="en-US" sz="1800" b="1" u="sng" dirty="0"/>
+              <a:t>Minor Positive Effectors: </a:t>
+            </a:r>
+            <a:endParaRPr lang="en-US" sz="1800" dirty="0"/>
+          </a:p>
+          <a:p>
+            <a:pPr marL="0" indent="0">
+              <a:buNone/>
+            </a:pPr>
+            <a:r>
+              <a:rPr lang="en-US" sz="1800" dirty="0"/>
+              <a:t>    1. Effective age </a:t>
+            </a:r>
+          </a:p>
+          <a:p>
+            <a:pPr marL="0" indent="0">
+              <a:buNone/>
+            </a:pPr>
+            <a:r>
+              <a:rPr lang="en-US" sz="1800" dirty="0"/>
+              <a:t>    2. Selling in Spring</a:t>
+            </a:r>
+          </a:p>
+          <a:p>
+            <a:pPr marL="0" indent="0">
+              <a:buNone/>
+            </a:pPr>
+            <a:r>
+              <a:rPr lang="en-US" sz="1800" dirty="0"/>
+              <a:t>    3. Selling in Summer</a:t>
+            </a:r>
+          </a:p>
+          <a:p>
+            <a:pPr marL="0" indent="0">
+              <a:buNone/>
+            </a:pPr>
+            <a:r>
+              <a:rPr lang="en-US" sz="1800" dirty="0"/>
+              <a:t>  </a:t>
+            </a:r>
+          </a:p>
+        </p:txBody>
+      </p:sp>
+      <p:pic>
+        <p:nvPicPr>
+          <p:cNvPr id="4" name="Picture 3">
+            <a:extLst>
+              <a:ext uri="{FF2B5EF4-FFF2-40B4-BE49-F238E27FC236}">
+                <a16:creationId xmlns:a16="http://schemas.microsoft.com/office/drawing/2014/main" id="{FF9B25DC-BD09-C54F-8731-0BA8AAB5A93C}"/>
+              </a:ext>
+            </a:extLst>
+          </p:cNvPr>
+          <p:cNvPicPr>
+            <a:picLocks noChangeAspect="1"/>
+          </p:cNvPicPr>
+          <p:nvPr/>
+        </p:nvPicPr>
+        <p:blipFill>
+          <a:blip r:embed="rId2"/>
+          <a:stretch>
+            <a:fillRect/>
+          </a:stretch>
+        </p:blipFill>
+        <p:spPr>
+          <a:xfrm>
+            <a:off x="6635531" y="1709793"/>
+            <a:ext cx="5080000" cy="3822700"/>
+          </a:xfrm>
+          <a:prstGeom prst="rect">
+            <a:avLst/>
+          </a:prstGeom>
+        </p:spPr>
+      </p:pic>
+      <p:sp>
+        <p:nvSpPr>
+          <p:cNvPr id="5" name="Rectangle 4">
+            <a:extLst>
+              <a:ext uri="{FF2B5EF4-FFF2-40B4-BE49-F238E27FC236}">
+                <a16:creationId xmlns:a16="http://schemas.microsoft.com/office/drawing/2014/main" id="{B0389E9C-47A1-DE4E-B30C-3E730AA537B7}"/>
+              </a:ext>
+            </a:extLst>
+          </p:cNvPr>
+          <p:cNvSpPr/>
+          <p:nvPr/>
+        </p:nvSpPr>
+        <p:spPr>
+          <a:xfrm>
+            <a:off x="6650230" y="2310251"/>
+            <a:ext cx="1688663" cy="3241347"/>
+          </a:xfrm>
+          <a:prstGeom prst="rect">
+            <a:avLst/>
+          </a:prstGeom>
+          <a:solidFill>
+            <a:srgbClr val="FFC000">
+              <a:alpha val="40000"/>
+            </a:srgbClr>
+          </a:solidFill>
+        </p:spPr>
+        <p:style>
+          <a:lnRef idx="2">
+            <a:schemeClr val="accent1">
+              <a:shade val="50000"/>
+            </a:schemeClr>
+          </a:lnRef>
+          <a:fillRef idx="1">
+            <a:schemeClr val="accent1"/>
+          </a:fillRef>
+          <a:effectRef idx="0">
+            <a:schemeClr val="accent1"/>
+          </a:effectRef>
+          <a:fontRef idx="minor">
+            <a:schemeClr val="lt1"/>
+          </a:fontRef>
+        </p:style>
+        <p:txBody>
+          <a:bodyPr rtlCol="0" anchor="ctr"/>
+          <a:lstStyle/>
+          <a:p>
+            <a:pPr algn="ctr"/>
+            <a:endParaRPr lang="en-US"/>
+          </a:p>
+        </p:txBody>
+      </p:sp>
+      <p:sp>
+        <p:nvSpPr>
+          <p:cNvPr id="6" name="TextBox 5">
+            <a:extLst>
+              <a:ext uri="{FF2B5EF4-FFF2-40B4-BE49-F238E27FC236}">
+                <a16:creationId xmlns:a16="http://schemas.microsoft.com/office/drawing/2014/main" id="{35A6D97F-EE1E-F845-81E7-7067C987D34A}"/>
+              </a:ext>
+            </a:extLst>
+          </p:cNvPr>
+          <p:cNvSpPr txBox="1"/>
+          <p:nvPr/>
+        </p:nvSpPr>
+        <p:spPr>
+          <a:xfrm rot="16200000">
+            <a:off x="5750471" y="4079601"/>
+            <a:ext cx="2292132" cy="523220"/>
+          </a:xfrm>
+          <a:prstGeom prst="rect">
+            <a:avLst/>
+          </a:prstGeom>
+          <a:noFill/>
+        </p:spPr>
+        <p:txBody>
+          <a:bodyPr wrap="square" rtlCol="0">
+            <a:spAutoFit/>
+          </a:bodyPr>
+          <a:lstStyle/>
+          <a:p>
+            <a:r>
+              <a:rPr lang="en-US" sz="2800" b="1" dirty="0">
+                <a:latin typeface="Gotham Narrow Medium" pitchFamily="2" charset="0"/>
+              </a:rPr>
+              <a:t>Predictors</a:t>
+            </a:r>
+          </a:p>
+        </p:txBody>
+      </p:sp>
+      <mc:AlternateContent xmlns:mc="http://schemas.openxmlformats.org/markup-compatibility/2006">
+        <mc:Choice xmlns:p14="http://schemas.microsoft.com/office/powerpoint/2010/main" Requires="p14">
+          <p:contentPart p14:bwMode="auto" r:id="rId3">
+            <p14:nvContentPartPr>
+              <p14:cNvPr id="7" name="Ink 6">
+                <a:extLst>
+                  <a:ext uri="{FF2B5EF4-FFF2-40B4-BE49-F238E27FC236}">
+                    <a16:creationId xmlns:a16="http://schemas.microsoft.com/office/drawing/2014/main" id="{BBE9CF0B-C61B-934D-876A-28E9B017C9FC}"/>
+                  </a:ext>
+                </a:extLst>
+              </p14:cNvPr>
+              <p14:cNvContentPartPr/>
+              <p14:nvPr/>
+            </p14:nvContentPartPr>
+            <p14:xfrm>
+              <a:off x="8442852" y="2433852"/>
+              <a:ext cx="417960" cy="20160"/>
+            </p14:xfrm>
+          </p:contentPart>
+        </mc:Choice>
+        <mc:Fallback>
+          <p:pic>
+            <p:nvPicPr>
+              <p:cNvPr id="7" name="Ink 6">
+                <a:extLst>
+                  <a:ext uri="{FF2B5EF4-FFF2-40B4-BE49-F238E27FC236}">
+                    <a16:creationId xmlns:a16="http://schemas.microsoft.com/office/drawing/2014/main" id="{BBE9CF0B-C61B-934D-876A-28E9B017C9FC}"/>
+                  </a:ext>
+                </a:extLst>
+              </p:cNvPr>
+              <p:cNvPicPr/>
+              <p:nvPr/>
+            </p:nvPicPr>
+            <p:blipFill>
+              <a:blip r:embed="rId4"/>
+              <a:stretch>
+                <a:fillRect/>
+              </a:stretch>
+            </p:blipFill>
+            <p:spPr>
+              <a:xfrm>
+                <a:off x="8389212" y="2326212"/>
+                <a:ext cx="525600" cy="235800"/>
+              </a:xfrm>
+              <a:prstGeom prst="rect">
+                <a:avLst/>
+              </a:prstGeom>
+            </p:spPr>
+          </p:pic>
+        </mc:Fallback>
+      </mc:AlternateContent>
+      <mc:AlternateContent xmlns:mc="http://schemas.openxmlformats.org/markup-compatibility/2006">
+        <mc:Choice xmlns:p14="http://schemas.microsoft.com/office/powerpoint/2010/main" Requires="p14">
+          <p:contentPart p14:bwMode="auto" r:id="rId5">
+            <p14:nvContentPartPr>
+              <p14:cNvPr id="8" name="Ink 7">
+                <a:extLst>
+                  <a:ext uri="{FF2B5EF4-FFF2-40B4-BE49-F238E27FC236}">
+                    <a16:creationId xmlns:a16="http://schemas.microsoft.com/office/drawing/2014/main" id="{6CF3C5C3-A439-1F4C-9747-782257951CD7}"/>
+                  </a:ext>
+                </a:extLst>
+              </p14:cNvPr>
+              <p14:cNvContentPartPr/>
+              <p14:nvPr/>
+            </p14:nvContentPartPr>
+            <p14:xfrm>
+              <a:off x="8438172" y="2736252"/>
+              <a:ext cx="389160" cy="5760"/>
+            </p14:xfrm>
+          </p:contentPart>
+        </mc:Choice>
+        <mc:Fallback>
+          <p:pic>
+            <p:nvPicPr>
+              <p:cNvPr id="8" name="Ink 7">
+                <a:extLst>
+                  <a:ext uri="{FF2B5EF4-FFF2-40B4-BE49-F238E27FC236}">
+                    <a16:creationId xmlns:a16="http://schemas.microsoft.com/office/drawing/2014/main" id="{6CF3C5C3-A439-1F4C-9747-782257951CD7}"/>
+                  </a:ext>
+                </a:extLst>
+              </p:cNvPr>
+              <p:cNvPicPr/>
+              <p:nvPr/>
+            </p:nvPicPr>
+            <p:blipFill>
+              <a:blip r:embed="rId6"/>
+              <a:stretch>
+                <a:fillRect/>
+              </a:stretch>
+            </p:blipFill>
+            <p:spPr>
+              <a:xfrm>
+                <a:off x="8384532" y="2628252"/>
+                <a:ext cx="496800" cy="221400"/>
+              </a:xfrm>
+              <a:prstGeom prst="rect">
+                <a:avLst/>
+              </a:prstGeom>
+            </p:spPr>
+          </p:pic>
+        </mc:Fallback>
+      </mc:AlternateContent>
+      <mc:AlternateContent xmlns:mc="http://schemas.openxmlformats.org/markup-compatibility/2006">
+        <mc:Choice xmlns:p14="http://schemas.microsoft.com/office/powerpoint/2010/main" Requires="p14">
+          <p:contentPart p14:bwMode="auto" r:id="rId7">
+            <p14:nvContentPartPr>
+              <p14:cNvPr id="10" name="Ink 9">
+                <a:extLst>
+                  <a:ext uri="{FF2B5EF4-FFF2-40B4-BE49-F238E27FC236}">
+                    <a16:creationId xmlns:a16="http://schemas.microsoft.com/office/drawing/2014/main" id="{0C55ED63-BA50-CB4F-A01A-8BF6B485BA98}"/>
+                  </a:ext>
+                </a:extLst>
+              </p14:cNvPr>
+              <p14:cNvContentPartPr/>
+              <p14:nvPr/>
+            </p14:nvContentPartPr>
+            <p14:xfrm>
+              <a:off x="8432412" y="4223412"/>
+              <a:ext cx="459720" cy="360"/>
+            </p14:xfrm>
+          </p:contentPart>
+        </mc:Choice>
+        <mc:Fallback>
+          <p:pic>
+            <p:nvPicPr>
+              <p:cNvPr id="10" name="Ink 9">
+                <a:extLst>
+                  <a:ext uri="{FF2B5EF4-FFF2-40B4-BE49-F238E27FC236}">
+                    <a16:creationId xmlns:a16="http://schemas.microsoft.com/office/drawing/2014/main" id="{0C55ED63-BA50-CB4F-A01A-8BF6B485BA98}"/>
+                  </a:ext>
+                </a:extLst>
+              </p:cNvPr>
+              <p:cNvPicPr/>
+              <p:nvPr/>
+            </p:nvPicPr>
+            <p:blipFill>
+              <a:blip r:embed="rId8"/>
+              <a:stretch>
+                <a:fillRect/>
+              </a:stretch>
+            </p:blipFill>
+            <p:spPr>
+              <a:xfrm>
+                <a:off x="8378772" y="4115412"/>
+                <a:ext cx="567360" cy="216000"/>
+              </a:xfrm>
+              <a:prstGeom prst="rect">
+                <a:avLst/>
+              </a:prstGeom>
+            </p:spPr>
+          </p:pic>
+        </mc:Fallback>
+      </mc:AlternateContent>
+      <mc:AlternateContent xmlns:mc="http://schemas.openxmlformats.org/markup-compatibility/2006">
+        <mc:Choice xmlns:p14="http://schemas.microsoft.com/office/powerpoint/2010/main" Requires="p14">
+          <p:contentPart p14:bwMode="auto" r:id="rId9">
+            <p14:nvContentPartPr>
+              <p14:cNvPr id="11" name="Ink 10">
+                <a:extLst>
+                  <a:ext uri="{FF2B5EF4-FFF2-40B4-BE49-F238E27FC236}">
+                    <a16:creationId xmlns:a16="http://schemas.microsoft.com/office/drawing/2014/main" id="{94F3D33A-7841-4E4F-BCB0-00738BB3FB5E}"/>
+                  </a:ext>
+                </a:extLst>
+              </p14:cNvPr>
+              <p14:cNvContentPartPr/>
+              <p14:nvPr/>
+            </p14:nvContentPartPr>
+            <p14:xfrm>
+              <a:off x="8437092" y="5362452"/>
+              <a:ext cx="417240" cy="46080"/>
+            </p14:xfrm>
+          </p:contentPart>
+        </mc:Choice>
+        <mc:Fallback>
+          <p:pic>
+            <p:nvPicPr>
+              <p:cNvPr id="11" name="Ink 10">
+                <a:extLst>
+                  <a:ext uri="{FF2B5EF4-FFF2-40B4-BE49-F238E27FC236}">
+                    <a16:creationId xmlns:a16="http://schemas.microsoft.com/office/drawing/2014/main" id="{94F3D33A-7841-4E4F-BCB0-00738BB3FB5E}"/>
+                  </a:ext>
+                </a:extLst>
+              </p:cNvPr>
+              <p:cNvPicPr/>
+              <p:nvPr/>
+            </p:nvPicPr>
+            <p:blipFill>
+              <a:blip r:embed="rId10"/>
+              <a:stretch>
+                <a:fillRect/>
+              </a:stretch>
+            </p:blipFill>
+            <p:spPr>
+              <a:xfrm>
+                <a:off x="8383092" y="5254812"/>
+                <a:ext cx="524880" cy="261720"/>
+              </a:xfrm>
+              <a:prstGeom prst="rect">
+                <a:avLst/>
+              </a:prstGeom>
+            </p:spPr>
+          </p:pic>
+        </mc:Fallback>
+      </mc:AlternateContent>
+      <mc:AlternateContent xmlns:mc="http://schemas.openxmlformats.org/markup-compatibility/2006">
+        <mc:Choice xmlns:p14="http://schemas.microsoft.com/office/powerpoint/2010/main" Requires="p14">
+          <p:contentPart p14:bwMode="auto" r:id="rId11">
+            <p14:nvContentPartPr>
+              <p14:cNvPr id="14" name="Ink 13">
+                <a:extLst>
+                  <a:ext uri="{FF2B5EF4-FFF2-40B4-BE49-F238E27FC236}">
+                    <a16:creationId xmlns:a16="http://schemas.microsoft.com/office/drawing/2014/main" id="{32305D3A-A102-6E47-B18E-F7EA3B888927}"/>
+                  </a:ext>
+                </a:extLst>
+              </p14:cNvPr>
+              <p14:cNvContentPartPr/>
+              <p14:nvPr/>
+            </p14:nvContentPartPr>
+            <p14:xfrm>
+              <a:off x="8440332" y="3023172"/>
+              <a:ext cx="428400" cy="360"/>
+            </p14:xfrm>
+          </p:contentPart>
+        </mc:Choice>
+        <mc:Fallback>
+          <p:pic>
+            <p:nvPicPr>
+              <p:cNvPr id="14" name="Ink 13">
+                <a:extLst>
+                  <a:ext uri="{FF2B5EF4-FFF2-40B4-BE49-F238E27FC236}">
+                    <a16:creationId xmlns:a16="http://schemas.microsoft.com/office/drawing/2014/main" id="{32305D3A-A102-6E47-B18E-F7EA3B888927}"/>
+                  </a:ext>
+                </a:extLst>
+              </p:cNvPr>
+              <p:cNvPicPr/>
+              <p:nvPr/>
+            </p:nvPicPr>
+            <p:blipFill>
+              <a:blip r:embed="rId12"/>
+              <a:stretch>
+                <a:fillRect/>
+              </a:stretch>
+            </p:blipFill>
+            <p:spPr>
+              <a:xfrm>
+                <a:off x="8386332" y="2915532"/>
+                <a:ext cx="536040" cy="216000"/>
+              </a:xfrm>
+              <a:prstGeom prst="rect">
+                <a:avLst/>
+              </a:prstGeom>
+            </p:spPr>
+          </p:pic>
+        </mc:Fallback>
+      </mc:AlternateContent>
+      <mc:AlternateContent xmlns:mc="http://schemas.openxmlformats.org/markup-compatibility/2006">
+        <mc:Choice xmlns:p14="http://schemas.microsoft.com/office/powerpoint/2010/main" Requires="p14">
+          <p:contentPart p14:bwMode="auto" r:id="rId13">
+            <p14:nvContentPartPr>
+              <p14:cNvPr id="15" name="Ink 14">
+                <a:extLst>
+                  <a:ext uri="{FF2B5EF4-FFF2-40B4-BE49-F238E27FC236}">
+                    <a16:creationId xmlns:a16="http://schemas.microsoft.com/office/drawing/2014/main" id="{C02D39C3-E79D-D840-AA34-B707D2728F66}"/>
+                  </a:ext>
+                </a:extLst>
+              </p14:cNvPr>
+              <p14:cNvContentPartPr/>
+              <p14:nvPr/>
+            </p14:nvContentPartPr>
+            <p14:xfrm>
+              <a:off x="8444292" y="4506012"/>
+              <a:ext cx="410400" cy="360"/>
+            </p14:xfrm>
+          </p:contentPart>
+        </mc:Choice>
+        <mc:Fallback>
+          <p:pic>
+            <p:nvPicPr>
+              <p:cNvPr id="15" name="Ink 14">
+                <a:extLst>
+                  <a:ext uri="{FF2B5EF4-FFF2-40B4-BE49-F238E27FC236}">
+                    <a16:creationId xmlns:a16="http://schemas.microsoft.com/office/drawing/2014/main" id="{C02D39C3-E79D-D840-AA34-B707D2728F66}"/>
+                  </a:ext>
+                </a:extLst>
+              </p:cNvPr>
+              <p:cNvPicPr/>
+              <p:nvPr/>
+            </p:nvPicPr>
+            <p:blipFill>
+              <a:blip r:embed="rId14"/>
+              <a:stretch>
+                <a:fillRect/>
+              </a:stretch>
+            </p:blipFill>
+            <p:spPr>
+              <a:xfrm>
+                <a:off x="8390652" y="4398012"/>
+                <a:ext cx="518040" cy="216000"/>
+              </a:xfrm>
+              <a:prstGeom prst="rect">
+                <a:avLst/>
+              </a:prstGeom>
+            </p:spPr>
+          </p:pic>
+        </mc:Fallback>
+      </mc:AlternateContent>
+      <mc:AlternateContent xmlns:mc="http://schemas.openxmlformats.org/markup-compatibility/2006">
+        <mc:Choice xmlns:p14="http://schemas.microsoft.com/office/powerpoint/2010/main" Requires="p14">
+          <p:contentPart p14:bwMode="auto" r:id="rId15">
+            <p14:nvContentPartPr>
+              <p14:cNvPr id="16" name="Ink 15">
+                <a:extLst>
+                  <a:ext uri="{FF2B5EF4-FFF2-40B4-BE49-F238E27FC236}">
+                    <a16:creationId xmlns:a16="http://schemas.microsoft.com/office/drawing/2014/main" id="{ECB30299-5C19-074E-98DF-4C0380AEEF96}"/>
+                  </a:ext>
+                </a:extLst>
+              </p14:cNvPr>
+              <p14:cNvContentPartPr/>
+              <p14:nvPr/>
+            </p14:nvContentPartPr>
+            <p14:xfrm>
+              <a:off x="8412252" y="4781412"/>
+              <a:ext cx="453960" cy="35280"/>
+            </p14:xfrm>
+          </p:contentPart>
+        </mc:Choice>
+        <mc:Fallback>
+          <p:pic>
+            <p:nvPicPr>
+              <p:cNvPr id="16" name="Ink 15">
+                <a:extLst>
+                  <a:ext uri="{FF2B5EF4-FFF2-40B4-BE49-F238E27FC236}">
+                    <a16:creationId xmlns:a16="http://schemas.microsoft.com/office/drawing/2014/main" id="{ECB30299-5C19-074E-98DF-4C0380AEEF96}"/>
+                  </a:ext>
+                </a:extLst>
+              </p:cNvPr>
+              <p:cNvPicPr/>
+              <p:nvPr/>
+            </p:nvPicPr>
+            <p:blipFill>
+              <a:blip r:embed="rId16"/>
+              <a:stretch>
+                <a:fillRect/>
+              </a:stretch>
+            </p:blipFill>
+            <p:spPr>
+              <a:xfrm>
+                <a:off x="8358252" y="4673412"/>
+                <a:ext cx="561600" cy="250920"/>
+              </a:xfrm>
+              <a:prstGeom prst="rect">
+                <a:avLst/>
+              </a:prstGeom>
+            </p:spPr>
+          </p:pic>
+        </mc:Fallback>
+      </mc:AlternateContent>
+    </p:spTree>
+    <p:extLst>
+      <p:ext uri="{BB962C8B-B14F-4D97-AF65-F5344CB8AC3E}">
+        <p14:creationId xmlns:p14="http://schemas.microsoft.com/office/powerpoint/2010/main" val="3424370726"/>
+      </p:ext>
+    </p:extLst>
+  </p:cSld>
+  <p:clrMapOvr>
+    <a:masterClrMapping/>
+  </p:clrMapOvr>
+</p:sld>
+</file>
+
+<file path=ppt/slides/slide7.xml><?xml version="1.0" encoding="utf-8"?>
+<p:sld xmlns:a="http://schemas.openxmlformats.org/drawingml/2006/main" xmlns:r="http://schemas.openxmlformats.org/officeDocument/2006/relationships" xmlns:p="http://schemas.openxmlformats.org/presentationml/2006/main">
+  <p:cSld>
+    <p:spTree>
+      <p:nvGrpSpPr>
+        <p:cNvPr id="1" name=""/>
+        <p:cNvGrpSpPr/>
+        <p:nvPr/>
+      </p:nvGrpSpPr>
+      <p:grpSpPr>
+        <a:xfrm>
+          <a:off x="0" y="0"/>
+          <a:ext cx="0" cy="0"/>
+          <a:chOff x="0" y="0"/>
+          <a:chExt cx="0" cy="0"/>
+        </a:xfrm>
+      </p:grpSpPr>
+      <p:sp>
+        <p:nvSpPr>
+          <p:cNvPr id="2" name="Title 1">
+            <a:extLst>
+              <a:ext uri="{FF2B5EF4-FFF2-40B4-BE49-F238E27FC236}">
+                <a16:creationId xmlns:a16="http://schemas.microsoft.com/office/drawing/2014/main" id="{D7505700-4689-5F44-9538-0CB7ADD2393F}"/>
+              </a:ext>
+            </a:extLst>
+          </p:cNvPr>
+          <p:cNvSpPr>
+            <a:spLocks noGrp="1"/>
+          </p:cNvSpPr>
+          <p:nvPr>
+            <p:ph type="title"/>
+          </p:nvPr>
+        </p:nvSpPr>
+        <p:spPr/>
+        <p:txBody>
+          <a:bodyPr/>
+          <a:lstStyle/>
+          <a:p>
+            <a:r>
+              <a:rPr lang="en-US" dirty="0"/>
+              <a:t>Model Result – Negative Effectors</a:t>
+            </a:r>
+          </a:p>
+        </p:txBody>
+      </p:sp>
+      <p:sp>
+        <p:nvSpPr>
+          <p:cNvPr id="3" name="Content Placeholder 2">
+            <a:extLst>
+              <a:ext uri="{FF2B5EF4-FFF2-40B4-BE49-F238E27FC236}">
+                <a16:creationId xmlns:a16="http://schemas.microsoft.com/office/drawing/2014/main" id="{3FBFC376-5AC6-B646-8D3C-BDAA8EA0D2AE}"/>
+              </a:ext>
+            </a:extLst>
+          </p:cNvPr>
+          <p:cNvSpPr>
+            <a:spLocks noGrp="1"/>
+          </p:cNvSpPr>
+          <p:nvPr>
+            <p:ph idx="1"/>
+          </p:nvPr>
+        </p:nvSpPr>
+        <p:spPr>
+          <a:xfrm>
+            <a:off x="838200" y="1825625"/>
+            <a:ext cx="5709745" cy="4351338"/>
+          </a:xfrm>
+        </p:spPr>
+        <p:txBody>
+          <a:bodyPr>
+            <a:normAutofit/>
+          </a:bodyPr>
+          <a:lstStyle/>
+          <a:p>
+            <a:pPr marL="0" indent="0">
+              <a:buNone/>
+            </a:pPr>
+            <a:r>
+              <a:rPr lang="en-US" sz="1800" b="1" u="sng" dirty="0"/>
+              <a:t>Major Negative Effectors:</a:t>
+            </a:r>
+            <a:endParaRPr lang="en-US" sz="1800" b="1" dirty="0"/>
+          </a:p>
+          <a:p>
+            <a:pPr marL="0" indent="0">
+              <a:buNone/>
+            </a:pPr>
+            <a:r>
+              <a:rPr lang="en-US" sz="1800" dirty="0"/>
+              <a:t>    1. mean distance from main attractions = further you 	live, the value goes down generally</a:t>
+            </a:r>
+          </a:p>
+          <a:p>
+            <a:pPr marL="0" indent="0">
+              <a:buNone/>
+            </a:pPr>
+            <a:r>
+              <a:rPr lang="en-US" sz="1800" dirty="0"/>
+              <a:t>    2. distance from Microsoft HQ = further you live, the 		value goes down generally</a:t>
+            </a:r>
+          </a:p>
+          <a:p>
+            <a:pPr marL="0" indent="0">
+              <a:buNone/>
+            </a:pPr>
+            <a:endParaRPr lang="en-US" sz="1800" dirty="0"/>
+          </a:p>
+          <a:p>
+            <a:pPr marL="0" indent="0">
+              <a:buNone/>
+            </a:pPr>
+            <a:r>
+              <a:rPr lang="en-US" sz="1800" b="1" u="sng" dirty="0"/>
+              <a:t>Minor Negative Effectors: </a:t>
+            </a:r>
+            <a:endParaRPr lang="en-US" sz="1800" dirty="0"/>
+          </a:p>
+          <a:p>
+            <a:pPr marL="0" indent="0">
+              <a:buNone/>
+            </a:pPr>
+            <a:r>
+              <a:rPr lang="en-US" sz="1800" dirty="0"/>
+              <a:t>    1. Mortgage rate – higher rate lowers the house value</a:t>
+            </a:r>
+          </a:p>
+          <a:p>
+            <a:pPr marL="0" indent="0">
+              <a:buNone/>
+            </a:pPr>
+            <a:r>
+              <a:rPr lang="en-US" sz="1800" dirty="0"/>
+              <a:t>    2. Selling in winter</a:t>
+            </a:r>
+          </a:p>
+          <a:p>
+            <a:pPr marL="0" indent="0">
+              <a:buNone/>
+            </a:pPr>
+            <a:r>
+              <a:rPr lang="en-US" sz="1800" dirty="0"/>
+              <a:t>  </a:t>
+            </a:r>
+          </a:p>
+        </p:txBody>
+      </p:sp>
+      <p:pic>
+        <p:nvPicPr>
+          <p:cNvPr id="4" name="Picture 3">
+            <a:extLst>
+              <a:ext uri="{FF2B5EF4-FFF2-40B4-BE49-F238E27FC236}">
+                <a16:creationId xmlns:a16="http://schemas.microsoft.com/office/drawing/2014/main" id="{FF9B25DC-BD09-C54F-8731-0BA8AAB5A93C}"/>
+              </a:ext>
+            </a:extLst>
+          </p:cNvPr>
+          <p:cNvPicPr>
+            <a:picLocks noChangeAspect="1"/>
+          </p:cNvPicPr>
+          <p:nvPr/>
+        </p:nvPicPr>
+        <p:blipFill>
+          <a:blip r:embed="rId2"/>
+          <a:stretch>
+            <a:fillRect/>
+          </a:stretch>
+        </p:blipFill>
+        <p:spPr>
+          <a:xfrm>
+            <a:off x="6635531" y="1709793"/>
+            <a:ext cx="5080000" cy="3822700"/>
+          </a:xfrm>
+          <a:prstGeom prst="rect">
+            <a:avLst/>
+          </a:prstGeom>
+        </p:spPr>
+      </p:pic>
+      <p:sp>
+        <p:nvSpPr>
+          <p:cNvPr id="5" name="Rectangle 4">
+            <a:extLst>
+              <a:ext uri="{FF2B5EF4-FFF2-40B4-BE49-F238E27FC236}">
+                <a16:creationId xmlns:a16="http://schemas.microsoft.com/office/drawing/2014/main" id="{B0389E9C-47A1-DE4E-B30C-3E730AA537B7}"/>
+              </a:ext>
+            </a:extLst>
+          </p:cNvPr>
+          <p:cNvSpPr/>
+          <p:nvPr/>
+        </p:nvSpPr>
+        <p:spPr>
+          <a:xfrm>
+            <a:off x="6650230" y="2310251"/>
+            <a:ext cx="1688663" cy="3241347"/>
+          </a:xfrm>
+          <a:prstGeom prst="rect">
+            <a:avLst/>
+          </a:prstGeom>
+          <a:solidFill>
+            <a:srgbClr val="FFC000">
+              <a:alpha val="40000"/>
+            </a:srgbClr>
+          </a:solidFill>
+        </p:spPr>
+        <p:style>
+          <a:lnRef idx="2">
+            <a:schemeClr val="accent1">
+              <a:shade val="50000"/>
+            </a:schemeClr>
+          </a:lnRef>
+          <a:fillRef idx="1">
+            <a:schemeClr val="accent1"/>
+          </a:fillRef>
+          <a:effectRef idx="0">
+            <a:schemeClr val="accent1"/>
+          </a:effectRef>
+          <a:fontRef idx="minor">
+            <a:schemeClr val="lt1"/>
+          </a:fontRef>
+        </p:style>
+        <p:txBody>
+          <a:bodyPr rtlCol="0" anchor="ctr"/>
+          <a:lstStyle/>
+          <a:p>
+            <a:pPr algn="ctr"/>
+            <a:endParaRPr lang="en-US"/>
+          </a:p>
+        </p:txBody>
+      </p:sp>
+      <p:sp>
+        <p:nvSpPr>
+          <p:cNvPr id="6" name="TextBox 5">
+            <a:extLst>
+              <a:ext uri="{FF2B5EF4-FFF2-40B4-BE49-F238E27FC236}">
+                <a16:creationId xmlns:a16="http://schemas.microsoft.com/office/drawing/2014/main" id="{35A6D97F-EE1E-F845-81E7-7067C987D34A}"/>
+              </a:ext>
+            </a:extLst>
+          </p:cNvPr>
+          <p:cNvSpPr txBox="1"/>
+          <p:nvPr/>
+        </p:nvSpPr>
+        <p:spPr>
+          <a:xfrm rot="16200000">
+            <a:off x="5750471" y="4079601"/>
+            <a:ext cx="2292132" cy="523220"/>
+          </a:xfrm>
+          <a:prstGeom prst="rect">
+            <a:avLst/>
+          </a:prstGeom>
+          <a:noFill/>
+        </p:spPr>
+        <p:txBody>
+          <a:bodyPr wrap="square" rtlCol="0">
+            <a:spAutoFit/>
+          </a:bodyPr>
+          <a:lstStyle/>
+          <a:p>
+            <a:r>
+              <a:rPr lang="en-US" sz="2800" b="1" dirty="0">
+                <a:latin typeface="Gotham Narrow Medium" pitchFamily="2" charset="0"/>
+              </a:rPr>
+              <a:t>Predictors</a:t>
+            </a:r>
+          </a:p>
+        </p:txBody>
+      </p:sp>
+      <mc:AlternateContent xmlns:mc="http://schemas.openxmlformats.org/markup-compatibility/2006">
+        <mc:Choice xmlns:p14="http://schemas.microsoft.com/office/powerpoint/2010/main" Requires="p14">
+          <p:contentPart p14:bwMode="auto" r:id="rId3">
+            <p14:nvContentPartPr>
+              <p14:cNvPr id="9" name="Ink 8">
+                <a:extLst>
+                  <a:ext uri="{FF2B5EF4-FFF2-40B4-BE49-F238E27FC236}">
+                    <a16:creationId xmlns:a16="http://schemas.microsoft.com/office/drawing/2014/main" id="{9AF94A1D-24AB-C84A-9CDF-C900EF55AE48}"/>
+                  </a:ext>
+                </a:extLst>
+              </p14:cNvPr>
+              <p14:cNvContentPartPr/>
+              <p14:nvPr/>
+            </p14:nvContentPartPr>
+            <p14:xfrm>
+              <a:off x="8427372" y="3622932"/>
+              <a:ext cx="432720" cy="7200"/>
+            </p14:xfrm>
+          </p:contentPart>
+        </mc:Choice>
+        <mc:Fallback>
+          <p:pic>
+            <p:nvPicPr>
+              <p:cNvPr id="9" name="Ink 8">
+                <a:extLst>
+                  <a:ext uri="{FF2B5EF4-FFF2-40B4-BE49-F238E27FC236}">
+                    <a16:creationId xmlns:a16="http://schemas.microsoft.com/office/drawing/2014/main" id="{9AF94A1D-24AB-C84A-9CDF-C900EF55AE48}"/>
+                  </a:ext>
+                </a:extLst>
+              </p:cNvPr>
+              <p:cNvPicPr/>
+              <p:nvPr/>
+            </p:nvPicPr>
+            <p:blipFill>
+              <a:blip r:embed="rId4"/>
+              <a:stretch>
+                <a:fillRect/>
+              </a:stretch>
+            </p:blipFill>
+            <p:spPr>
+              <a:xfrm>
+                <a:off x="8373732" y="3515292"/>
+                <a:ext cx="540360" cy="222840"/>
+              </a:xfrm>
+              <a:prstGeom prst="rect">
+                <a:avLst/>
+              </a:prstGeom>
+            </p:spPr>
+          </p:pic>
+        </mc:Fallback>
+      </mc:AlternateContent>
+      <mc:AlternateContent xmlns:mc="http://schemas.openxmlformats.org/markup-compatibility/2006">
+        <mc:Choice xmlns:p14="http://schemas.microsoft.com/office/powerpoint/2010/main" Requires="p14">
+          <p:contentPart p14:bwMode="auto" r:id="rId5">
+            <p14:nvContentPartPr>
+              <p14:cNvPr id="17" name="Ink 16">
+                <a:extLst>
+                  <a:ext uri="{FF2B5EF4-FFF2-40B4-BE49-F238E27FC236}">
+                    <a16:creationId xmlns:a16="http://schemas.microsoft.com/office/drawing/2014/main" id="{78DB1134-DAFC-8542-B885-FD8823C1281F}"/>
+                  </a:ext>
+                </a:extLst>
+              </p14:cNvPr>
+              <p14:cNvContentPartPr/>
+              <p14:nvPr/>
+            </p14:nvContentPartPr>
+            <p14:xfrm>
+              <a:off x="8406852" y="3910212"/>
+              <a:ext cx="430200" cy="8280"/>
+            </p14:xfrm>
+          </p:contentPart>
+        </mc:Choice>
+        <mc:Fallback>
+          <p:pic>
+            <p:nvPicPr>
+              <p:cNvPr id="17" name="Ink 16">
+                <a:extLst>
+                  <a:ext uri="{FF2B5EF4-FFF2-40B4-BE49-F238E27FC236}">
+                    <a16:creationId xmlns:a16="http://schemas.microsoft.com/office/drawing/2014/main" id="{78DB1134-DAFC-8542-B885-FD8823C1281F}"/>
+                  </a:ext>
+                </a:extLst>
+              </p:cNvPr>
+              <p:cNvPicPr/>
+              <p:nvPr/>
+            </p:nvPicPr>
+            <p:blipFill>
+              <a:blip r:embed="rId6"/>
+              <a:stretch>
+                <a:fillRect/>
+              </a:stretch>
+            </p:blipFill>
+            <p:spPr>
+              <a:xfrm>
+                <a:off x="8353212" y="3802212"/>
+                <a:ext cx="537840" cy="223920"/>
+              </a:xfrm>
+              <a:prstGeom prst="rect">
+                <a:avLst/>
+              </a:prstGeom>
+            </p:spPr>
+          </p:pic>
+        </mc:Fallback>
+      </mc:AlternateContent>
+      <mc:AlternateContent xmlns:mc="http://schemas.openxmlformats.org/markup-compatibility/2006">
+        <mc:Choice xmlns:p14="http://schemas.microsoft.com/office/powerpoint/2010/main" Requires="p14">
+          <p:contentPart p14:bwMode="auto" r:id="rId7">
+            <p14:nvContentPartPr>
+              <p14:cNvPr id="19" name="Ink 18">
+                <a:extLst>
+                  <a:ext uri="{FF2B5EF4-FFF2-40B4-BE49-F238E27FC236}">
+                    <a16:creationId xmlns:a16="http://schemas.microsoft.com/office/drawing/2014/main" id="{B0AA0668-5B59-6C46-BEFB-58ECE6054542}"/>
+                  </a:ext>
+                </a:extLst>
+              </p14:cNvPr>
+              <p14:cNvContentPartPr/>
+              <p14:nvPr/>
+            </p14:nvContentPartPr>
+            <p14:xfrm>
+              <a:off x="8403972" y="3311172"/>
+              <a:ext cx="437040" cy="13680"/>
+            </p14:xfrm>
+          </p:contentPart>
+        </mc:Choice>
+        <mc:Fallback>
+          <p:pic>
+            <p:nvPicPr>
+              <p:cNvPr id="19" name="Ink 18">
+                <a:extLst>
+                  <a:ext uri="{FF2B5EF4-FFF2-40B4-BE49-F238E27FC236}">
+                    <a16:creationId xmlns:a16="http://schemas.microsoft.com/office/drawing/2014/main" id="{B0AA0668-5B59-6C46-BEFB-58ECE6054542}"/>
+                  </a:ext>
+                </a:extLst>
+              </p:cNvPr>
+              <p:cNvPicPr/>
+              <p:nvPr/>
+            </p:nvPicPr>
+            <p:blipFill>
+              <a:blip r:embed="rId8"/>
+              <a:stretch>
+                <a:fillRect/>
+              </a:stretch>
+            </p:blipFill>
+            <p:spPr>
+              <a:xfrm>
+                <a:off x="8350332" y="3203172"/>
+                <a:ext cx="544680" cy="229320"/>
+              </a:xfrm>
+              <a:prstGeom prst="rect">
+                <a:avLst/>
+              </a:prstGeom>
+            </p:spPr>
+          </p:pic>
+        </mc:Fallback>
+      </mc:AlternateContent>
+      <mc:AlternateContent xmlns:mc="http://schemas.openxmlformats.org/markup-compatibility/2006">
+        <mc:Choice xmlns:p14="http://schemas.microsoft.com/office/powerpoint/2010/main" Requires="p14">
+          <p:contentPart p14:bwMode="auto" r:id="rId9">
+            <p14:nvContentPartPr>
+              <p14:cNvPr id="20" name="Ink 19">
+                <a:extLst>
+                  <a:ext uri="{FF2B5EF4-FFF2-40B4-BE49-F238E27FC236}">
+                    <a16:creationId xmlns:a16="http://schemas.microsoft.com/office/drawing/2014/main" id="{130BCD8D-AE85-4D41-B43F-C8068FB229F4}"/>
+                  </a:ext>
+                </a:extLst>
+              </p14:cNvPr>
+              <p14:cNvContentPartPr/>
+              <p14:nvPr/>
+            </p14:nvContentPartPr>
+            <p14:xfrm>
+              <a:off x="8411172" y="5081652"/>
+              <a:ext cx="387000" cy="6120"/>
+            </p14:xfrm>
+          </p:contentPart>
+        </mc:Choice>
+        <mc:Fallback>
+          <p:pic>
+            <p:nvPicPr>
+              <p:cNvPr id="20" name="Ink 19">
+                <a:extLst>
+                  <a:ext uri="{FF2B5EF4-FFF2-40B4-BE49-F238E27FC236}">
+                    <a16:creationId xmlns:a16="http://schemas.microsoft.com/office/drawing/2014/main" id="{130BCD8D-AE85-4D41-B43F-C8068FB229F4}"/>
+                  </a:ext>
+                </a:extLst>
+              </p:cNvPr>
+              <p:cNvPicPr/>
+              <p:nvPr/>
+            </p:nvPicPr>
+            <p:blipFill>
+              <a:blip r:embed="rId10"/>
+              <a:stretch>
+                <a:fillRect/>
+              </a:stretch>
+            </p:blipFill>
+            <p:spPr>
+              <a:xfrm>
+                <a:off x="8357532" y="4973652"/>
+                <a:ext cx="494640" cy="221760"/>
+              </a:xfrm>
+              <a:prstGeom prst="rect">
+                <a:avLst/>
+              </a:prstGeom>
+            </p:spPr>
+          </p:pic>
+        </mc:Fallback>
+      </mc:AlternateContent>
+    </p:spTree>
+    <p:extLst>
+      <p:ext uri="{BB962C8B-B14F-4D97-AF65-F5344CB8AC3E}">
+        <p14:creationId xmlns:p14="http://schemas.microsoft.com/office/powerpoint/2010/main" val="3114582013"/>
+      </p:ext>
+    </p:extLst>
+  </p:cSld>
+  <p:clrMapOvr>
+    <a:masterClrMapping/>
+  </p:clrMapOvr>
+</p:sld>
+</file>
+
+<file path=ppt/slides/slide8.xml><?xml version="1.0" encoding="utf-8"?>
+<p:sld xmlns:a="http://schemas.openxmlformats.org/drawingml/2006/main" xmlns:r="http://schemas.openxmlformats.org/officeDocument/2006/relationships" xmlns:p="http://schemas.openxmlformats.org/presentationml/2006/main">
+  <p:cSld>
+    <p:spTree>
+      <p:nvGrpSpPr>
+        <p:cNvPr id="1" name=""/>
+        <p:cNvGrpSpPr/>
+        <p:nvPr/>
+      </p:nvGrpSpPr>
+      <p:grpSpPr>
+        <a:xfrm>
+          <a:off x="0" y="0"/>
+          <a:ext cx="0" cy="0"/>
+          <a:chOff x="0" y="0"/>
+          <a:chExt cx="0" cy="0"/>
+        </a:xfrm>
+      </p:grpSpPr>
+      <p:sp>
+        <p:nvSpPr>
+          <p:cNvPr id="2" name="Title 1">
+            <a:extLst>
+              <a:ext uri="{FF2B5EF4-FFF2-40B4-BE49-F238E27FC236}">
+                <a16:creationId xmlns:a16="http://schemas.microsoft.com/office/drawing/2014/main" id="{F1480346-8EF5-9548-BE2C-3D931952782D}"/>
+              </a:ext>
+            </a:extLst>
+          </p:cNvPr>
+          <p:cNvSpPr>
+            <a:spLocks noGrp="1"/>
+          </p:cNvSpPr>
+          <p:nvPr>
+            <p:ph type="title"/>
+          </p:nvPr>
+        </p:nvSpPr>
+        <p:spPr/>
+        <p:txBody>
+          <a:bodyPr/>
+          <a:lstStyle/>
+          <a:p>
+            <a:r>
+              <a:rPr lang="en-US" dirty="0"/>
+              <a:t>Model Result - Accuracy</a:t>
+            </a:r>
+          </a:p>
+        </p:txBody>
+      </p:sp>
+      <p:pic>
+        <p:nvPicPr>
+          <p:cNvPr id="4" name="Picture 3">
+            <a:extLst>
+              <a:ext uri="{FF2B5EF4-FFF2-40B4-BE49-F238E27FC236}">
+                <a16:creationId xmlns:a16="http://schemas.microsoft.com/office/drawing/2014/main" id="{DAD4538F-06D3-8344-9F6A-B4A3F166869C}"/>
+              </a:ext>
+            </a:extLst>
+          </p:cNvPr>
+          <p:cNvPicPr>
+            <a:picLocks noChangeAspect="1"/>
+          </p:cNvPicPr>
+          <p:nvPr/>
+        </p:nvPicPr>
+        <p:blipFill>
+          <a:blip r:embed="rId2"/>
+          <a:stretch>
+            <a:fillRect/>
+          </a:stretch>
+        </p:blipFill>
+        <p:spPr>
+          <a:xfrm>
+            <a:off x="3790950" y="1467288"/>
+            <a:ext cx="4610100" cy="2730500"/>
+          </a:xfrm>
+          <a:prstGeom prst="rect">
+            <a:avLst/>
+          </a:prstGeom>
+        </p:spPr>
+      </p:pic>
+      <p:sp>
+        <p:nvSpPr>
+          <p:cNvPr id="6" name="Content Placeholder 2">
+            <a:extLst>
+              <a:ext uri="{FF2B5EF4-FFF2-40B4-BE49-F238E27FC236}">
+                <a16:creationId xmlns:a16="http://schemas.microsoft.com/office/drawing/2014/main" id="{5A2C95D7-E12D-B246-A170-7AC82260A2C1}"/>
+              </a:ext>
+            </a:extLst>
+          </p:cNvPr>
+          <p:cNvSpPr>
+            <a:spLocks noGrp="1"/>
+          </p:cNvSpPr>
+          <p:nvPr>
+            <p:ph idx="1"/>
+          </p:nvPr>
+        </p:nvSpPr>
+        <p:spPr>
+          <a:xfrm>
+            <a:off x="838200" y="4477406"/>
+            <a:ext cx="10515600" cy="2091559"/>
+          </a:xfrm>
+        </p:spPr>
+        <p:txBody>
+          <a:bodyPr>
+            <a:normAutofit fontScale="77500" lnSpcReduction="20000"/>
+          </a:bodyPr>
+          <a:lstStyle/>
+          <a:p>
+            <a:pPr marL="0" indent="0">
+              <a:buNone/>
+            </a:pPr>
+            <a:r>
+              <a:rPr lang="en-US" sz="4000" dirty="0">
+                <a:solidFill>
+                  <a:srgbClr val="FFFF00"/>
+                </a:solidFill>
+              </a:rPr>
+              <a:t>R-squared: </a:t>
+            </a:r>
+            <a:r>
+              <a:rPr lang="en-US" sz="4000" dirty="0"/>
+              <a:t>0.725</a:t>
+            </a:r>
+          </a:p>
+          <a:p>
+            <a:pPr>
+              <a:buFontTx/>
+              <a:buChar char="-"/>
+            </a:pPr>
+            <a:r>
+              <a:rPr lang="en-US" sz="4000" dirty="0"/>
+              <a:t>72.5 % of the price can be described by adding in the factors</a:t>
+            </a:r>
+          </a:p>
+          <a:p>
+            <a:pPr>
+              <a:buFontTx/>
+              <a:buChar char="-"/>
+            </a:pPr>
+            <a:r>
+              <a:rPr lang="en-US" sz="4000" dirty="0"/>
+              <a:t>This model can be used to intuitively understand how house prices are effected by different factors</a:t>
+            </a:r>
+          </a:p>
+          <a:p>
+            <a:pPr marL="0" indent="0">
+              <a:buNone/>
+            </a:pPr>
+            <a:endParaRPr lang="en-US" sz="4000" dirty="0"/>
+          </a:p>
+        </p:txBody>
+      </p:sp>
+      <mc:AlternateContent xmlns:mc="http://schemas.openxmlformats.org/markup-compatibility/2006">
+        <mc:Choice xmlns:p14="http://schemas.microsoft.com/office/powerpoint/2010/main" Requires="p14">
+          <p:contentPart p14:bwMode="auto" r:id="rId3">
+            <p14:nvContentPartPr>
+              <p14:cNvPr id="7" name="Ink 6">
+                <a:extLst>
+                  <a:ext uri="{FF2B5EF4-FFF2-40B4-BE49-F238E27FC236}">
+                    <a16:creationId xmlns:a16="http://schemas.microsoft.com/office/drawing/2014/main" id="{4FFEF4EF-4495-B94F-9F71-3D7BD9CA1999}"/>
+                  </a:ext>
+                </a:extLst>
+              </p14:cNvPr>
+              <p14:cNvContentPartPr/>
+              <p14:nvPr/>
+            </p14:nvContentPartPr>
+            <p14:xfrm>
+              <a:off x="6965442" y="1648770"/>
+              <a:ext cx="698760" cy="37080"/>
+            </p14:xfrm>
+          </p:contentPart>
+        </mc:Choice>
+        <mc:Fallback>
+          <p:pic>
+            <p:nvPicPr>
+              <p:cNvPr id="7" name="Ink 6">
+                <a:extLst>
+                  <a:ext uri="{FF2B5EF4-FFF2-40B4-BE49-F238E27FC236}">
+                    <a16:creationId xmlns:a16="http://schemas.microsoft.com/office/drawing/2014/main" id="{4FFEF4EF-4495-B94F-9F71-3D7BD9CA1999}"/>
+                  </a:ext>
+                </a:extLst>
+              </p:cNvPr>
+              <p:cNvPicPr/>
+              <p:nvPr/>
+            </p:nvPicPr>
+            <p:blipFill>
+              <a:blip r:embed="rId4"/>
+              <a:stretch>
+                <a:fillRect/>
+              </a:stretch>
+            </p:blipFill>
+            <p:spPr>
+              <a:xfrm>
+                <a:off x="6911442" y="1541130"/>
+                <a:ext cx="806400" cy="252720"/>
+              </a:xfrm>
+              <a:prstGeom prst="rect">
+                <a:avLst/>
+              </a:prstGeom>
+            </p:spPr>
+          </p:pic>
+        </mc:Fallback>
+      </mc:AlternateContent>
+    </p:spTree>
+    <p:extLst>
+      <p:ext uri="{BB962C8B-B14F-4D97-AF65-F5344CB8AC3E}">
+        <p14:creationId xmlns:p14="http://schemas.microsoft.com/office/powerpoint/2010/main" val="2639958982"/>
       </p:ext>
     </p:extLst>
   </p:cSld>

</xml_diff>